<commit_message>
Final commit day 1
</commit_message>
<xml_diff>
--- a/Microbiome_analysis/Workshop-overview.pptx
+++ b/Microbiome_analysis/Workshop-overview.pptx
@@ -5,19 +5,22 @@
     <p:sldMasterId id="2147483648" r:id="rId1"/>
   </p:sldMasterIdLst>
   <p:notesMasterIdLst>
-    <p:notesMasterId r:id="rId12"/>
+    <p:notesMasterId r:id="rId15"/>
   </p:notesMasterIdLst>
   <p:sldIdLst>
     <p:sldId id="256" r:id="rId2"/>
     <p:sldId id="262" r:id="rId3"/>
     <p:sldId id="284" r:id="rId4"/>
-    <p:sldId id="279" r:id="rId5"/>
-    <p:sldId id="280" r:id="rId6"/>
-    <p:sldId id="281" r:id="rId7"/>
-    <p:sldId id="278" r:id="rId8"/>
-    <p:sldId id="283" r:id="rId9"/>
-    <p:sldId id="285" r:id="rId10"/>
-    <p:sldId id="282" r:id="rId11"/>
+    <p:sldId id="286" r:id="rId5"/>
+    <p:sldId id="279" r:id="rId6"/>
+    <p:sldId id="287" r:id="rId7"/>
+    <p:sldId id="281" r:id="rId8"/>
+    <p:sldId id="280" r:id="rId9"/>
+    <p:sldId id="278" r:id="rId10"/>
+    <p:sldId id="285" r:id="rId11"/>
+    <p:sldId id="282" r:id="rId12"/>
+    <p:sldId id="288" r:id="rId13"/>
+    <p:sldId id="289" r:id="rId14"/>
   </p:sldIdLst>
   <p:sldSz cx="12192000" cy="6858000"/>
   <p:notesSz cx="6858000" cy="9144000"/>
@@ -206,7 +209,7 @@
           <a:p>
             <a:fld id="{BF2779A9-4D8B-B243-8673-A727FAB74B19}" type="datetimeFigureOut">
               <a:rPr lang="en-US" smtClean="0"/>
-              <a:t>10/29/23</a:t>
+              <a:t>10/30/23</a:t>
             </a:fld>
             <a:endParaRPr lang="en-US"/>
           </a:p>
@@ -572,7 +575,7 @@
     </p:spTree>
     <p:extLst>
       <p:ext uri="{BB962C8B-B14F-4D97-AF65-F5344CB8AC3E}">
-        <p14:creationId xmlns:p14="http://schemas.microsoft.com/office/powerpoint/2010/main" val="4192533150"/>
+        <p14:creationId xmlns:p14="http://schemas.microsoft.com/office/powerpoint/2010/main" val="348053749"/>
       </p:ext>
     </p:extLst>
   </p:cSld>
@@ -680,7 +683,7 @@
     </p:spTree>
     <p:extLst>
       <p:ext uri="{BB962C8B-B14F-4D97-AF65-F5344CB8AC3E}">
-        <p14:creationId xmlns:p14="http://schemas.microsoft.com/office/powerpoint/2010/main" val="3697658299"/>
+        <p14:creationId xmlns:p14="http://schemas.microsoft.com/office/powerpoint/2010/main" val="4192533150"/>
       </p:ext>
     </p:extLst>
   </p:cSld>
@@ -788,7 +791,7 @@
     </p:spTree>
     <p:extLst>
       <p:ext uri="{BB962C8B-B14F-4D97-AF65-F5344CB8AC3E}">
-        <p14:creationId xmlns:p14="http://schemas.microsoft.com/office/powerpoint/2010/main" val="1539226385"/>
+        <p14:creationId xmlns:p14="http://schemas.microsoft.com/office/powerpoint/2010/main" val="302743740"/>
       </p:ext>
     </p:extLst>
   </p:cSld>
@@ -896,7 +899,7 @@
     </p:spTree>
     <p:extLst>
       <p:ext uri="{BB962C8B-B14F-4D97-AF65-F5344CB8AC3E}">
-        <p14:creationId xmlns:p14="http://schemas.microsoft.com/office/powerpoint/2010/main" val="3297347667"/>
+        <p14:creationId xmlns:p14="http://schemas.microsoft.com/office/powerpoint/2010/main" val="1539226385"/>
       </p:ext>
     </p:extLst>
   </p:cSld>
@@ -1004,7 +1007,7 @@
     </p:spTree>
     <p:extLst>
       <p:ext uri="{BB962C8B-B14F-4D97-AF65-F5344CB8AC3E}">
-        <p14:creationId xmlns:p14="http://schemas.microsoft.com/office/powerpoint/2010/main" val="655667093"/>
+        <p14:creationId xmlns:p14="http://schemas.microsoft.com/office/powerpoint/2010/main" val="3697658299"/>
       </p:ext>
     </p:extLst>
   </p:cSld>
@@ -1103,7 +1106,115 @@
           <a:p>
             <a:fld id="{C5B1E7AA-E4F3-FA4E-8D35-49880D02CD3F}" type="slidenum">
               <a:rPr lang="en-US" smtClean="0"/>
-              <a:t>10</a:t>
+              <a:t>9</a:t>
+            </a:fld>
+            <a:endParaRPr lang="en-US"/>
+          </a:p>
+        </p:txBody>
+      </p:sp>
+    </p:spTree>
+    <p:extLst>
+      <p:ext uri="{BB962C8B-B14F-4D97-AF65-F5344CB8AC3E}">
+        <p14:creationId xmlns:p14="http://schemas.microsoft.com/office/powerpoint/2010/main" val="3297347667"/>
+      </p:ext>
+    </p:extLst>
+  </p:cSld>
+  <p:clrMapOvr>
+    <a:masterClrMapping/>
+  </p:clrMapOvr>
+</p:notes>
+</file>
+
+<file path=ppt/notesSlides/notesSlide7.xml><?xml version="1.0" encoding="utf-8"?>
+<p:notes xmlns:a="http://schemas.openxmlformats.org/drawingml/2006/main" xmlns:r="http://schemas.openxmlformats.org/officeDocument/2006/relationships" xmlns:p="http://schemas.openxmlformats.org/presentationml/2006/main">
+  <p:cSld>
+    <p:spTree>
+      <p:nvGrpSpPr>
+        <p:cNvPr id="1" name=""/>
+        <p:cNvGrpSpPr/>
+        <p:nvPr/>
+      </p:nvGrpSpPr>
+      <p:grpSpPr>
+        <a:xfrm>
+          <a:off x="0" y="0"/>
+          <a:ext cx="0" cy="0"/>
+          <a:chOff x="0" y="0"/>
+          <a:chExt cx="0" cy="0"/>
+        </a:xfrm>
+      </p:grpSpPr>
+      <p:sp>
+        <p:nvSpPr>
+          <p:cNvPr id="2" name="Slide Image Placeholder 1"/>
+          <p:cNvSpPr>
+            <a:spLocks noGrp="1" noRot="1" noChangeAspect="1"/>
+          </p:cNvSpPr>
+          <p:nvPr>
+            <p:ph type="sldImg"/>
+          </p:nvPr>
+        </p:nvSpPr>
+        <p:spPr/>
+      </p:sp>
+      <p:sp>
+        <p:nvSpPr>
+          <p:cNvPr id="3" name="Notes Placeholder 2"/>
+          <p:cNvSpPr>
+            <a:spLocks noGrp="1"/>
+          </p:cNvSpPr>
+          <p:nvPr>
+            <p:ph type="body" idx="1"/>
+          </p:nvPr>
+        </p:nvSpPr>
+        <p:spPr/>
+        <p:txBody>
+          <a:bodyPr/>
+          <a:lstStyle/>
+          <a:p>
+            <a:r>
+              <a:rPr lang="en-US" dirty="0"/>
+              <a:t>Introduction to Linux</a:t>
+            </a:r>
+          </a:p>
+          <a:p>
+            <a:r>
+              <a:rPr lang="en-US" dirty="0"/>
+              <a:t>Guidelines on the overview of the course</a:t>
+            </a:r>
+          </a:p>
+          <a:p>
+            <a:r>
+              <a:rPr lang="en-US" dirty="0"/>
+              <a:t>Interpretation of the data</a:t>
+            </a:r>
+          </a:p>
+          <a:p>
+            <a:r>
+              <a:rPr lang="en-US" dirty="0"/>
+              <a:t>Output of this used for R course</a:t>
+            </a:r>
+          </a:p>
+          <a:p>
+            <a:endParaRPr lang="en-US" dirty="0"/>
+          </a:p>
+        </p:txBody>
+      </p:sp>
+      <p:sp>
+        <p:nvSpPr>
+          <p:cNvPr id="4" name="Slide Number Placeholder 3"/>
+          <p:cNvSpPr>
+            <a:spLocks noGrp="1"/>
+          </p:cNvSpPr>
+          <p:nvPr>
+            <p:ph type="sldNum" sz="quarter" idx="5"/>
+          </p:nvPr>
+        </p:nvSpPr>
+        <p:spPr/>
+        <p:txBody>
+          <a:bodyPr/>
+          <a:lstStyle/>
+          <a:p>
+            <a:fld id="{C5B1E7AA-E4F3-FA4E-8D35-49880D02CD3F}" type="slidenum">
+              <a:rPr lang="en-US" smtClean="0"/>
+              <a:t>11</a:t>
             </a:fld>
             <a:endParaRPr lang="en-US"/>
           </a:p>
@@ -1113,6 +1224,222 @@
     <p:extLst>
       <p:ext uri="{BB962C8B-B14F-4D97-AF65-F5344CB8AC3E}">
         <p14:creationId xmlns:p14="http://schemas.microsoft.com/office/powerpoint/2010/main" val="3560676673"/>
+      </p:ext>
+    </p:extLst>
+  </p:cSld>
+  <p:clrMapOvr>
+    <a:masterClrMapping/>
+  </p:clrMapOvr>
+</p:notes>
+</file>
+
+<file path=ppt/notesSlides/notesSlide8.xml><?xml version="1.0" encoding="utf-8"?>
+<p:notes xmlns:a="http://schemas.openxmlformats.org/drawingml/2006/main" xmlns:r="http://schemas.openxmlformats.org/officeDocument/2006/relationships" xmlns:p="http://schemas.openxmlformats.org/presentationml/2006/main">
+  <p:cSld>
+    <p:spTree>
+      <p:nvGrpSpPr>
+        <p:cNvPr id="1" name=""/>
+        <p:cNvGrpSpPr/>
+        <p:nvPr/>
+      </p:nvGrpSpPr>
+      <p:grpSpPr>
+        <a:xfrm>
+          <a:off x="0" y="0"/>
+          <a:ext cx="0" cy="0"/>
+          <a:chOff x="0" y="0"/>
+          <a:chExt cx="0" cy="0"/>
+        </a:xfrm>
+      </p:grpSpPr>
+      <p:sp>
+        <p:nvSpPr>
+          <p:cNvPr id="2" name="Slide Image Placeholder 1"/>
+          <p:cNvSpPr>
+            <a:spLocks noGrp="1" noRot="1" noChangeAspect="1"/>
+          </p:cNvSpPr>
+          <p:nvPr>
+            <p:ph type="sldImg"/>
+          </p:nvPr>
+        </p:nvSpPr>
+        <p:spPr/>
+      </p:sp>
+      <p:sp>
+        <p:nvSpPr>
+          <p:cNvPr id="3" name="Notes Placeholder 2"/>
+          <p:cNvSpPr>
+            <a:spLocks noGrp="1"/>
+          </p:cNvSpPr>
+          <p:nvPr>
+            <p:ph type="body" idx="1"/>
+          </p:nvPr>
+        </p:nvSpPr>
+        <p:spPr/>
+        <p:txBody>
+          <a:bodyPr/>
+          <a:lstStyle/>
+          <a:p>
+            <a:r>
+              <a:rPr lang="en-US" dirty="0"/>
+              <a:t>Introduction to Linux</a:t>
+            </a:r>
+          </a:p>
+          <a:p>
+            <a:r>
+              <a:rPr lang="en-US" dirty="0"/>
+              <a:t>Guidelines on the overview of the course</a:t>
+            </a:r>
+          </a:p>
+          <a:p>
+            <a:r>
+              <a:rPr lang="en-US" dirty="0"/>
+              <a:t>Interpretation of the data</a:t>
+            </a:r>
+          </a:p>
+          <a:p>
+            <a:r>
+              <a:rPr lang="en-US" dirty="0"/>
+              <a:t>Output of this used for R course</a:t>
+            </a:r>
+          </a:p>
+          <a:p>
+            <a:endParaRPr lang="en-US" dirty="0"/>
+          </a:p>
+        </p:txBody>
+      </p:sp>
+      <p:sp>
+        <p:nvSpPr>
+          <p:cNvPr id="4" name="Slide Number Placeholder 3"/>
+          <p:cNvSpPr>
+            <a:spLocks noGrp="1"/>
+          </p:cNvSpPr>
+          <p:nvPr>
+            <p:ph type="sldNum" sz="quarter" idx="5"/>
+          </p:nvPr>
+        </p:nvSpPr>
+        <p:spPr/>
+        <p:txBody>
+          <a:bodyPr/>
+          <a:lstStyle/>
+          <a:p>
+            <a:fld id="{C5B1E7AA-E4F3-FA4E-8D35-49880D02CD3F}" type="slidenum">
+              <a:rPr lang="en-US" smtClean="0"/>
+              <a:t>12</a:t>
+            </a:fld>
+            <a:endParaRPr lang="en-US"/>
+          </a:p>
+        </p:txBody>
+      </p:sp>
+    </p:spTree>
+    <p:extLst>
+      <p:ext uri="{BB962C8B-B14F-4D97-AF65-F5344CB8AC3E}">
+        <p14:creationId xmlns:p14="http://schemas.microsoft.com/office/powerpoint/2010/main" val="2473806680"/>
+      </p:ext>
+    </p:extLst>
+  </p:cSld>
+  <p:clrMapOvr>
+    <a:masterClrMapping/>
+  </p:clrMapOvr>
+</p:notes>
+</file>
+
+<file path=ppt/notesSlides/notesSlide9.xml><?xml version="1.0" encoding="utf-8"?>
+<p:notes xmlns:a="http://schemas.openxmlformats.org/drawingml/2006/main" xmlns:r="http://schemas.openxmlformats.org/officeDocument/2006/relationships" xmlns:p="http://schemas.openxmlformats.org/presentationml/2006/main">
+  <p:cSld>
+    <p:spTree>
+      <p:nvGrpSpPr>
+        <p:cNvPr id="1" name=""/>
+        <p:cNvGrpSpPr/>
+        <p:nvPr/>
+      </p:nvGrpSpPr>
+      <p:grpSpPr>
+        <a:xfrm>
+          <a:off x="0" y="0"/>
+          <a:ext cx="0" cy="0"/>
+          <a:chOff x="0" y="0"/>
+          <a:chExt cx="0" cy="0"/>
+        </a:xfrm>
+      </p:grpSpPr>
+      <p:sp>
+        <p:nvSpPr>
+          <p:cNvPr id="2" name="Slide Image Placeholder 1"/>
+          <p:cNvSpPr>
+            <a:spLocks noGrp="1" noRot="1" noChangeAspect="1"/>
+          </p:cNvSpPr>
+          <p:nvPr>
+            <p:ph type="sldImg"/>
+          </p:nvPr>
+        </p:nvSpPr>
+        <p:spPr/>
+      </p:sp>
+      <p:sp>
+        <p:nvSpPr>
+          <p:cNvPr id="3" name="Notes Placeholder 2"/>
+          <p:cNvSpPr>
+            <a:spLocks noGrp="1"/>
+          </p:cNvSpPr>
+          <p:nvPr>
+            <p:ph type="body" idx="1"/>
+          </p:nvPr>
+        </p:nvSpPr>
+        <p:spPr/>
+        <p:txBody>
+          <a:bodyPr/>
+          <a:lstStyle/>
+          <a:p>
+            <a:r>
+              <a:rPr lang="en-US" dirty="0"/>
+              <a:t>Introduction to Linux</a:t>
+            </a:r>
+          </a:p>
+          <a:p>
+            <a:r>
+              <a:rPr lang="en-US" dirty="0"/>
+              <a:t>Guidelines on the overview of the course</a:t>
+            </a:r>
+          </a:p>
+          <a:p>
+            <a:r>
+              <a:rPr lang="en-US" dirty="0"/>
+              <a:t>Interpretation of the data</a:t>
+            </a:r>
+          </a:p>
+          <a:p>
+            <a:r>
+              <a:rPr lang="en-US" dirty="0"/>
+              <a:t>Output of this used for R course</a:t>
+            </a:r>
+          </a:p>
+          <a:p>
+            <a:endParaRPr lang="en-US" dirty="0"/>
+          </a:p>
+        </p:txBody>
+      </p:sp>
+      <p:sp>
+        <p:nvSpPr>
+          <p:cNvPr id="4" name="Slide Number Placeholder 3"/>
+          <p:cNvSpPr>
+            <a:spLocks noGrp="1"/>
+          </p:cNvSpPr>
+          <p:nvPr>
+            <p:ph type="sldNum" sz="quarter" idx="5"/>
+          </p:nvPr>
+        </p:nvSpPr>
+        <p:spPr/>
+        <p:txBody>
+          <a:bodyPr/>
+          <a:lstStyle/>
+          <a:p>
+            <a:fld id="{C5B1E7AA-E4F3-FA4E-8D35-49880D02CD3F}" type="slidenum">
+              <a:rPr lang="en-US" smtClean="0"/>
+              <a:t>13</a:t>
+            </a:fld>
+            <a:endParaRPr lang="en-US"/>
+          </a:p>
+        </p:txBody>
+      </p:sp>
+    </p:spTree>
+    <p:extLst>
+      <p:ext uri="{BB962C8B-B14F-4D97-AF65-F5344CB8AC3E}">
+        <p14:creationId xmlns:p14="http://schemas.microsoft.com/office/powerpoint/2010/main" val="3398418112"/>
       </p:ext>
     </p:extLst>
   </p:cSld>
@@ -1271,7 +1598,7 @@
           <a:p>
             <a:fld id="{1EEB538C-FDA8-984E-84B8-B05C676A140B}" type="datetimeFigureOut">
               <a:rPr lang="en-US" smtClean="0"/>
-              <a:t>10/29/23</a:t>
+              <a:t>10/30/23</a:t>
             </a:fld>
             <a:endParaRPr lang="en-US"/>
           </a:p>
@@ -1471,7 +1798,7 @@
           <a:p>
             <a:fld id="{1EEB538C-FDA8-984E-84B8-B05C676A140B}" type="datetimeFigureOut">
               <a:rPr lang="en-US" smtClean="0"/>
-              <a:t>10/29/23</a:t>
+              <a:t>10/30/23</a:t>
             </a:fld>
             <a:endParaRPr lang="en-US"/>
           </a:p>
@@ -1681,7 +2008,7 @@
           <a:p>
             <a:fld id="{1EEB538C-FDA8-984E-84B8-B05C676A140B}" type="datetimeFigureOut">
               <a:rPr lang="en-US" smtClean="0"/>
-              <a:t>10/29/23</a:t>
+              <a:t>10/30/23</a:t>
             </a:fld>
             <a:endParaRPr lang="en-US"/>
           </a:p>
@@ -1881,7 +2208,7 @@
           <a:p>
             <a:fld id="{1EEB538C-FDA8-984E-84B8-B05C676A140B}" type="datetimeFigureOut">
               <a:rPr lang="en-US" smtClean="0"/>
-              <a:t>10/29/23</a:t>
+              <a:t>10/30/23</a:t>
             </a:fld>
             <a:endParaRPr lang="en-US"/>
           </a:p>
@@ -2157,7 +2484,7 @@
           <a:p>
             <a:fld id="{1EEB538C-FDA8-984E-84B8-B05C676A140B}" type="datetimeFigureOut">
               <a:rPr lang="en-US" smtClean="0"/>
-              <a:t>10/29/23</a:t>
+              <a:t>10/30/23</a:t>
             </a:fld>
             <a:endParaRPr lang="en-US"/>
           </a:p>
@@ -2425,7 +2752,7 @@
           <a:p>
             <a:fld id="{1EEB538C-FDA8-984E-84B8-B05C676A140B}" type="datetimeFigureOut">
               <a:rPr lang="en-US" smtClean="0"/>
-              <a:t>10/29/23</a:t>
+              <a:t>10/30/23</a:t>
             </a:fld>
             <a:endParaRPr lang="en-US"/>
           </a:p>
@@ -2840,7 +3167,7 @@
           <a:p>
             <a:fld id="{1EEB538C-FDA8-984E-84B8-B05C676A140B}" type="datetimeFigureOut">
               <a:rPr lang="en-US" smtClean="0"/>
-              <a:t>10/29/23</a:t>
+              <a:t>10/30/23</a:t>
             </a:fld>
             <a:endParaRPr lang="en-US"/>
           </a:p>
@@ -2982,7 +3309,7 @@
           <a:p>
             <a:fld id="{1EEB538C-FDA8-984E-84B8-B05C676A140B}" type="datetimeFigureOut">
               <a:rPr lang="en-US" smtClean="0"/>
-              <a:t>10/29/23</a:t>
+              <a:t>10/30/23</a:t>
             </a:fld>
             <a:endParaRPr lang="en-US"/>
           </a:p>
@@ -3095,7 +3422,7 @@
           <a:p>
             <a:fld id="{1EEB538C-FDA8-984E-84B8-B05C676A140B}" type="datetimeFigureOut">
               <a:rPr lang="en-US" smtClean="0"/>
-              <a:t>10/29/23</a:t>
+              <a:t>10/30/23</a:t>
             </a:fld>
             <a:endParaRPr lang="en-US"/>
           </a:p>
@@ -3408,7 +3735,7 @@
           <a:p>
             <a:fld id="{1EEB538C-FDA8-984E-84B8-B05C676A140B}" type="datetimeFigureOut">
               <a:rPr lang="en-US" smtClean="0"/>
-              <a:t>10/29/23</a:t>
+              <a:t>10/30/23</a:t>
             </a:fld>
             <a:endParaRPr lang="en-US"/>
           </a:p>
@@ -3697,7 +4024,7 @@
           <a:p>
             <a:fld id="{1EEB538C-FDA8-984E-84B8-B05C676A140B}" type="datetimeFigureOut">
               <a:rPr lang="en-US" smtClean="0"/>
-              <a:t>10/29/23</a:t>
+              <a:t>10/30/23</a:t>
             </a:fld>
             <a:endParaRPr lang="en-US"/>
           </a:p>
@@ -3940,7 +4267,7 @@
           <a:p>
             <a:fld id="{1EEB538C-FDA8-984E-84B8-B05C676A140B}" type="datetimeFigureOut">
               <a:rPr lang="en-US" smtClean="0"/>
-              <a:t>10/29/23</a:t>
+              <a:t>10/30/23</a:t>
             </a:fld>
             <a:endParaRPr lang="en-US"/>
           </a:p>
@@ -4610,6 +4937,687 @@
           <a:p>
             <a:pPr algn="ctr"/>
             <a:r>
+              <a:rPr lang="en-US" sz="3200" u="sng" dirty="0">
+                <a:latin typeface="Arial" panose="020B0604020202020204" pitchFamily="34" charset="0"/>
+                <a:cs typeface="Arial" panose="020B0604020202020204" pitchFamily="34" charset="0"/>
+              </a:rPr>
+              <a:t>How to write the report</a:t>
+            </a:r>
+          </a:p>
+        </p:txBody>
+      </p:sp>
+      <p:grpSp>
+        <p:nvGrpSpPr>
+          <p:cNvPr id="7" name="Group 6">
+            <a:extLst>
+              <a:ext uri="{FF2B5EF4-FFF2-40B4-BE49-F238E27FC236}">
+                <a16:creationId xmlns:a16="http://schemas.microsoft.com/office/drawing/2014/main" id="{1E12B08A-3213-4CAE-415C-2466BC855D46}"/>
+              </a:ext>
+            </a:extLst>
+          </p:cNvPr>
+          <p:cNvGrpSpPr/>
+          <p:nvPr/>
+        </p:nvGrpSpPr>
+        <p:grpSpPr>
+          <a:xfrm>
+            <a:off x="625689" y="1483777"/>
+            <a:ext cx="2192594" cy="4404853"/>
+            <a:chOff x="570271" y="1317522"/>
+            <a:chExt cx="2192594" cy="4404853"/>
+          </a:xfrm>
+        </p:grpSpPr>
+        <p:sp>
+          <p:nvSpPr>
+            <p:cNvPr id="4" name="Trapezium 3">
+              <a:extLst>
+                <a:ext uri="{FF2B5EF4-FFF2-40B4-BE49-F238E27FC236}">
+                  <a16:creationId xmlns:a16="http://schemas.microsoft.com/office/drawing/2014/main" id="{0D6F35C2-09D3-4CF9-D526-2BCA3FBD6E87}"/>
+                </a:ext>
+              </a:extLst>
+            </p:cNvPr>
+            <p:cNvSpPr/>
+            <p:nvPr/>
+          </p:nvSpPr>
+          <p:spPr>
+            <a:xfrm rot="10800000">
+              <a:off x="570271" y="1317522"/>
+              <a:ext cx="2192594" cy="2202426"/>
+            </a:xfrm>
+            <a:prstGeom prst="trapezoid">
+              <a:avLst>
+                <a:gd name="adj" fmla="val 37258"/>
+              </a:avLst>
+            </a:prstGeom>
+            <a:noFill/>
+            <a:ln w="76200">
+              <a:solidFill>
+                <a:srgbClr val="002060"/>
+              </a:solidFill>
+            </a:ln>
+          </p:spPr>
+          <p:style>
+            <a:lnRef idx="2">
+              <a:schemeClr val="accent1">
+                <a:shade val="50000"/>
+              </a:schemeClr>
+            </a:lnRef>
+            <a:fillRef idx="1">
+              <a:schemeClr val="accent1"/>
+            </a:fillRef>
+            <a:effectRef idx="0">
+              <a:schemeClr val="accent1"/>
+            </a:effectRef>
+            <a:fontRef idx="minor">
+              <a:schemeClr val="lt1"/>
+            </a:fontRef>
+          </p:style>
+          <p:txBody>
+            <a:bodyPr rtlCol="0" anchor="ctr"/>
+            <a:lstStyle/>
+            <a:p>
+              <a:pPr algn="ctr"/>
+              <a:endParaRPr lang="en-US"/>
+            </a:p>
+          </p:txBody>
+        </p:sp>
+        <p:sp>
+          <p:nvSpPr>
+            <p:cNvPr id="5" name="Trapezium 4">
+              <a:extLst>
+                <a:ext uri="{FF2B5EF4-FFF2-40B4-BE49-F238E27FC236}">
+                  <a16:creationId xmlns:a16="http://schemas.microsoft.com/office/drawing/2014/main" id="{9FDB81E2-D3C7-11C9-0975-3FA318C2AD6D}"/>
+                </a:ext>
+              </a:extLst>
+            </p:cNvPr>
+            <p:cNvSpPr/>
+            <p:nvPr/>
+          </p:nvSpPr>
+          <p:spPr>
+            <a:xfrm>
+              <a:off x="570271" y="3519949"/>
+              <a:ext cx="2192594" cy="2202426"/>
+            </a:xfrm>
+            <a:prstGeom prst="trapezoid">
+              <a:avLst>
+                <a:gd name="adj" fmla="val 37258"/>
+              </a:avLst>
+            </a:prstGeom>
+            <a:noFill/>
+            <a:ln w="76200">
+              <a:solidFill>
+                <a:srgbClr val="002060"/>
+              </a:solidFill>
+            </a:ln>
+          </p:spPr>
+          <p:style>
+            <a:lnRef idx="2">
+              <a:schemeClr val="accent1">
+                <a:shade val="50000"/>
+              </a:schemeClr>
+            </a:lnRef>
+            <a:fillRef idx="1">
+              <a:schemeClr val="accent1"/>
+            </a:fillRef>
+            <a:effectRef idx="0">
+              <a:schemeClr val="accent1"/>
+            </a:effectRef>
+            <a:fontRef idx="minor">
+              <a:schemeClr val="lt1"/>
+            </a:fontRef>
+          </p:style>
+          <p:txBody>
+            <a:bodyPr rtlCol="0" anchor="ctr"/>
+            <a:lstStyle/>
+            <a:p>
+              <a:pPr algn="ctr"/>
+              <a:endParaRPr lang="en-US"/>
+            </a:p>
+          </p:txBody>
+        </p:sp>
+        <p:sp>
+          <p:nvSpPr>
+            <p:cNvPr id="6" name="Rectangle 5">
+              <a:extLst>
+                <a:ext uri="{FF2B5EF4-FFF2-40B4-BE49-F238E27FC236}">
+                  <a16:creationId xmlns:a16="http://schemas.microsoft.com/office/drawing/2014/main" id="{2CDDAFBF-9FE9-8943-303E-7DB6AB9C6AF2}"/>
+                </a:ext>
+              </a:extLst>
+            </p:cNvPr>
+            <p:cNvSpPr/>
+            <p:nvPr/>
+          </p:nvSpPr>
+          <p:spPr>
+            <a:xfrm>
+              <a:off x="1410962" y="3182471"/>
+              <a:ext cx="502617" cy="779929"/>
+            </a:xfrm>
+            <a:prstGeom prst="rect">
+              <a:avLst/>
+            </a:prstGeom>
+            <a:solidFill>
+              <a:schemeClr val="bg1"/>
+            </a:solidFill>
+            <a:ln>
+              <a:noFill/>
+            </a:ln>
+          </p:spPr>
+          <p:style>
+            <a:lnRef idx="2">
+              <a:schemeClr val="accent1">
+                <a:shade val="50000"/>
+              </a:schemeClr>
+            </a:lnRef>
+            <a:fillRef idx="1">
+              <a:schemeClr val="accent1"/>
+            </a:fillRef>
+            <a:effectRef idx="0">
+              <a:schemeClr val="accent1"/>
+            </a:effectRef>
+            <a:fontRef idx="minor">
+              <a:schemeClr val="lt1"/>
+            </a:fontRef>
+          </p:style>
+          <p:txBody>
+            <a:bodyPr rtlCol="0" anchor="ctr"/>
+            <a:lstStyle/>
+            <a:p>
+              <a:pPr algn="ctr"/>
+              <a:endParaRPr lang="en-US"/>
+            </a:p>
+          </p:txBody>
+        </p:sp>
+      </p:grpSp>
+      <p:sp>
+        <p:nvSpPr>
+          <p:cNvPr id="8" name="TextBox 7">
+            <a:extLst>
+              <a:ext uri="{FF2B5EF4-FFF2-40B4-BE49-F238E27FC236}">
+                <a16:creationId xmlns:a16="http://schemas.microsoft.com/office/drawing/2014/main" id="{A6EEFC67-77B9-80A1-AC5D-63F4D1BB761F}"/>
+              </a:ext>
+            </a:extLst>
+          </p:cNvPr>
+          <p:cNvSpPr txBox="1"/>
+          <p:nvPr/>
+        </p:nvSpPr>
+        <p:spPr>
+          <a:xfrm>
+            <a:off x="317184" y="1627879"/>
+            <a:ext cx="2902608" cy="338554"/>
+          </a:xfrm>
+          <a:prstGeom prst="rect">
+            <a:avLst/>
+          </a:prstGeom>
+          <a:noFill/>
+        </p:spPr>
+        <p:txBody>
+          <a:bodyPr wrap="square" rtlCol="0">
+            <a:spAutoFit/>
+          </a:bodyPr>
+          <a:lstStyle/>
+          <a:p>
+            <a:pPr algn="ctr"/>
+            <a:r>
+              <a:rPr lang="en-US" sz="1600" i="1" dirty="0">
+                <a:latin typeface="Arial" panose="020B0604020202020204" pitchFamily="34" charset="0"/>
+                <a:cs typeface="Arial" panose="020B0604020202020204" pitchFamily="34" charset="0"/>
+              </a:rPr>
+              <a:t>Introduction</a:t>
+            </a:r>
+          </a:p>
+        </p:txBody>
+      </p:sp>
+      <p:sp>
+        <p:nvSpPr>
+          <p:cNvPr id="9" name="TextBox 8">
+            <a:extLst>
+              <a:ext uri="{FF2B5EF4-FFF2-40B4-BE49-F238E27FC236}">
+                <a16:creationId xmlns:a16="http://schemas.microsoft.com/office/drawing/2014/main" id="{47F18639-B14D-FA9C-902A-843791AC8DBC}"/>
+              </a:ext>
+            </a:extLst>
+          </p:cNvPr>
+          <p:cNvSpPr txBox="1"/>
+          <p:nvPr/>
+        </p:nvSpPr>
+        <p:spPr>
+          <a:xfrm>
+            <a:off x="266384" y="2866711"/>
+            <a:ext cx="2902608" cy="338554"/>
+          </a:xfrm>
+          <a:prstGeom prst="rect">
+            <a:avLst/>
+          </a:prstGeom>
+          <a:noFill/>
+        </p:spPr>
+        <p:txBody>
+          <a:bodyPr wrap="square" rtlCol="0">
+            <a:spAutoFit/>
+          </a:bodyPr>
+          <a:lstStyle/>
+          <a:p>
+            <a:pPr algn="ctr"/>
+            <a:r>
+              <a:rPr lang="en-US" sz="1600" i="1" dirty="0">
+                <a:latin typeface="Arial" panose="020B0604020202020204" pitchFamily="34" charset="0"/>
+                <a:cs typeface="Arial" panose="020B0604020202020204" pitchFamily="34" charset="0"/>
+              </a:rPr>
+              <a:t>Methods</a:t>
+            </a:r>
+          </a:p>
+        </p:txBody>
+      </p:sp>
+      <p:sp>
+        <p:nvSpPr>
+          <p:cNvPr id="10" name="TextBox 9">
+            <a:extLst>
+              <a:ext uri="{FF2B5EF4-FFF2-40B4-BE49-F238E27FC236}">
+                <a16:creationId xmlns:a16="http://schemas.microsoft.com/office/drawing/2014/main" id="{62636537-8E9B-6F2F-7334-0B2C27B3859D}"/>
+              </a:ext>
+            </a:extLst>
+          </p:cNvPr>
+          <p:cNvSpPr txBox="1"/>
+          <p:nvPr/>
+        </p:nvSpPr>
+        <p:spPr>
+          <a:xfrm>
+            <a:off x="266384" y="3967065"/>
+            <a:ext cx="2902608" cy="338554"/>
+          </a:xfrm>
+          <a:prstGeom prst="rect">
+            <a:avLst/>
+          </a:prstGeom>
+          <a:noFill/>
+        </p:spPr>
+        <p:txBody>
+          <a:bodyPr wrap="square" rtlCol="0">
+            <a:spAutoFit/>
+          </a:bodyPr>
+          <a:lstStyle/>
+          <a:p>
+            <a:pPr algn="ctr"/>
+            <a:r>
+              <a:rPr lang="en-US" sz="1600" i="1" dirty="0">
+                <a:latin typeface="Arial" panose="020B0604020202020204" pitchFamily="34" charset="0"/>
+                <a:cs typeface="Arial" panose="020B0604020202020204" pitchFamily="34" charset="0"/>
+              </a:rPr>
+              <a:t>Results</a:t>
+            </a:r>
+          </a:p>
+        </p:txBody>
+      </p:sp>
+      <p:sp>
+        <p:nvSpPr>
+          <p:cNvPr id="11" name="TextBox 10">
+            <a:extLst>
+              <a:ext uri="{FF2B5EF4-FFF2-40B4-BE49-F238E27FC236}">
+                <a16:creationId xmlns:a16="http://schemas.microsoft.com/office/drawing/2014/main" id="{5DB114D6-F60D-7889-5DBF-D3AC7D56E9E8}"/>
+              </a:ext>
+            </a:extLst>
+          </p:cNvPr>
+          <p:cNvSpPr txBox="1"/>
+          <p:nvPr/>
+        </p:nvSpPr>
+        <p:spPr>
+          <a:xfrm>
+            <a:off x="317184" y="5374223"/>
+            <a:ext cx="2902608" cy="338554"/>
+          </a:xfrm>
+          <a:prstGeom prst="rect">
+            <a:avLst/>
+          </a:prstGeom>
+          <a:noFill/>
+        </p:spPr>
+        <p:txBody>
+          <a:bodyPr wrap="square" rtlCol="0">
+            <a:spAutoFit/>
+          </a:bodyPr>
+          <a:lstStyle/>
+          <a:p>
+            <a:pPr algn="ctr"/>
+            <a:r>
+              <a:rPr lang="en-US" sz="1600" i="1" dirty="0">
+                <a:latin typeface="Arial" panose="020B0604020202020204" pitchFamily="34" charset="0"/>
+                <a:cs typeface="Arial" panose="020B0604020202020204" pitchFamily="34" charset="0"/>
+              </a:rPr>
+              <a:t>Discussion</a:t>
+            </a:r>
+          </a:p>
+        </p:txBody>
+      </p:sp>
+      <p:sp>
+        <p:nvSpPr>
+          <p:cNvPr id="12" name="TextBox 11">
+            <a:extLst>
+              <a:ext uri="{FF2B5EF4-FFF2-40B4-BE49-F238E27FC236}">
+                <a16:creationId xmlns:a16="http://schemas.microsoft.com/office/drawing/2014/main" id="{6697A785-9FC8-4CBF-673C-7AB2A5C086E9}"/>
+              </a:ext>
+            </a:extLst>
+          </p:cNvPr>
+          <p:cNvSpPr txBox="1"/>
+          <p:nvPr/>
+        </p:nvSpPr>
+        <p:spPr>
+          <a:xfrm>
+            <a:off x="3168991" y="1017639"/>
+            <a:ext cx="8917906" cy="5755422"/>
+          </a:xfrm>
+          <a:prstGeom prst="rect">
+            <a:avLst/>
+          </a:prstGeom>
+          <a:noFill/>
+        </p:spPr>
+        <p:txBody>
+          <a:bodyPr wrap="square" rtlCol="0">
+            <a:spAutoFit/>
+          </a:bodyPr>
+          <a:lstStyle/>
+          <a:p>
+            <a:r>
+              <a:rPr lang="en-US" sz="1600" i="1" u="sng" dirty="0">
+                <a:latin typeface="Arial" panose="020B0604020202020204" pitchFamily="34" charset="0"/>
+                <a:cs typeface="Arial" panose="020B0604020202020204" pitchFamily="34" charset="0"/>
+              </a:rPr>
+              <a:t>Introduction</a:t>
+            </a:r>
+          </a:p>
+          <a:p>
+            <a:pPr marL="285750" indent="-285750">
+              <a:buFontTx/>
+              <a:buChar char="-"/>
+            </a:pPr>
+            <a:r>
+              <a:rPr lang="en-US" sz="1600" dirty="0">
+                <a:latin typeface="Arial" panose="020B0604020202020204" pitchFamily="34" charset="0"/>
+                <a:cs typeface="Arial" panose="020B0604020202020204" pitchFamily="34" charset="0"/>
+              </a:rPr>
+              <a:t>Always starts with the broader picture</a:t>
+            </a:r>
+          </a:p>
+          <a:p>
+            <a:pPr marL="285750" indent="-285750">
+              <a:buFontTx/>
+              <a:buChar char="-"/>
+            </a:pPr>
+            <a:r>
+              <a:rPr lang="en-US" sz="1600" dirty="0">
+                <a:latin typeface="Arial" panose="020B0604020202020204" pitchFamily="34" charset="0"/>
+                <a:cs typeface="Arial" panose="020B0604020202020204" pitchFamily="34" charset="0"/>
+              </a:rPr>
+              <a:t>1-2 paragraphs on metagenomics and/or liver cirrhosis</a:t>
+            </a:r>
+          </a:p>
+          <a:p>
+            <a:pPr marL="285750" indent="-285750">
+              <a:buFontTx/>
+              <a:buChar char="-"/>
+            </a:pPr>
+            <a:r>
+              <a:rPr lang="en-US" sz="1600" dirty="0">
+                <a:latin typeface="Arial" panose="020B0604020202020204" pitchFamily="34" charset="0"/>
+                <a:cs typeface="Arial" panose="020B0604020202020204" pitchFamily="34" charset="0"/>
+              </a:rPr>
+              <a:t>1-2 paragraphs on insights of specific studies of the microbiome in liver disease</a:t>
+            </a:r>
+          </a:p>
+          <a:p>
+            <a:pPr marL="285750" indent="-285750">
+              <a:buFontTx/>
+              <a:buChar char="-"/>
+            </a:pPr>
+            <a:r>
+              <a:rPr lang="en-US" sz="1600" dirty="0">
+                <a:latin typeface="Arial" panose="020B0604020202020204" pitchFamily="34" charset="0"/>
+                <a:cs typeface="Arial" panose="020B0604020202020204" pitchFamily="34" charset="0"/>
+              </a:rPr>
+              <a:t>1 paragraph on what you will do in this study</a:t>
+            </a:r>
+          </a:p>
+          <a:p>
+            <a:pPr marL="742950" lvl="1" indent="-285750">
+              <a:buFontTx/>
+              <a:buChar char="-"/>
+            </a:pPr>
+            <a:r>
+              <a:rPr lang="en-US" sz="1600" dirty="0">
+                <a:latin typeface="Arial" panose="020B0604020202020204" pitchFamily="34" charset="0"/>
+                <a:cs typeface="Arial" panose="020B0604020202020204" pitchFamily="34" charset="0"/>
+              </a:rPr>
+              <a:t>”In this report/study I will analyze …. to study the impact of microbiome on liver disease in ….. “</a:t>
+            </a:r>
+          </a:p>
+          <a:p>
+            <a:pPr lvl="1"/>
+            <a:endParaRPr lang="en-US" sz="1600" dirty="0">
+              <a:latin typeface="Arial" panose="020B0604020202020204" pitchFamily="34" charset="0"/>
+              <a:cs typeface="Arial" panose="020B0604020202020204" pitchFamily="34" charset="0"/>
+            </a:endParaRPr>
+          </a:p>
+          <a:p>
+            <a:r>
+              <a:rPr lang="en-US" sz="1600" i="1" u="sng" dirty="0">
+                <a:latin typeface="Arial" panose="020B0604020202020204" pitchFamily="34" charset="0"/>
+                <a:cs typeface="Arial" panose="020B0604020202020204" pitchFamily="34" charset="0"/>
+              </a:rPr>
+              <a:t>Methods</a:t>
+            </a:r>
+          </a:p>
+          <a:p>
+            <a:r>
+              <a:rPr lang="en-US" sz="1600" dirty="0">
+                <a:latin typeface="Arial" panose="020B0604020202020204" pitchFamily="34" charset="0"/>
+                <a:cs typeface="Arial" panose="020B0604020202020204" pitchFamily="34" charset="0"/>
+              </a:rPr>
+              <a:t>Try and gather as much from original paper under a heading “Sample data” and summarize in 1 paragraph</a:t>
+            </a:r>
+          </a:p>
+          <a:p>
+            <a:r>
+              <a:rPr lang="en-US" sz="1600" dirty="0">
+                <a:latin typeface="Arial" panose="020B0604020202020204" pitchFamily="34" charset="0"/>
+                <a:cs typeface="Arial" panose="020B0604020202020204" pitchFamily="34" charset="0"/>
+              </a:rPr>
+              <a:t>Then describe what you did </a:t>
+            </a:r>
+            <a:r>
+              <a:rPr lang="en-US" sz="1600" dirty="0">
+                <a:latin typeface="Arial" panose="020B0604020202020204" pitchFamily="34" charset="0"/>
+                <a:cs typeface="Arial" panose="020B0604020202020204" pitchFamily="34" charset="0"/>
+                <a:sym typeface="Wingdings" pitchFamily="2" charset="2"/>
+              </a:rPr>
+              <a:t> </a:t>
+            </a:r>
+            <a:r>
+              <a:rPr lang="en-US" sz="1600" dirty="0" err="1">
+                <a:latin typeface="Arial" panose="020B0604020202020204" pitchFamily="34" charset="0"/>
+                <a:cs typeface="Arial" panose="020B0604020202020204" pitchFamily="34" charset="0"/>
+                <a:sym typeface="Wingdings" pitchFamily="2" charset="2"/>
+              </a:rPr>
+              <a:t>metaphlan</a:t>
+            </a:r>
+            <a:r>
+              <a:rPr lang="en-US" sz="1600" dirty="0">
+                <a:latin typeface="Arial" panose="020B0604020202020204" pitchFamily="34" charset="0"/>
+                <a:cs typeface="Arial" panose="020B0604020202020204" pitchFamily="34" charset="0"/>
+                <a:sym typeface="Wingdings" pitchFamily="2" charset="2"/>
+              </a:rPr>
+              <a:t>, downstream analysis</a:t>
+            </a:r>
+          </a:p>
+          <a:p>
+            <a:r>
+              <a:rPr lang="en-US" sz="1600" dirty="0">
+                <a:latin typeface="Arial" panose="020B0604020202020204" pitchFamily="34" charset="0"/>
+                <a:cs typeface="Arial" panose="020B0604020202020204" pitchFamily="34" charset="0"/>
+                <a:sym typeface="Wingdings" pitchFamily="2" charset="2"/>
+              </a:rPr>
+              <a:t>You can attach scripts as appendices</a:t>
+            </a:r>
+          </a:p>
+          <a:p>
+            <a:endParaRPr lang="en-US" sz="1600" dirty="0">
+              <a:latin typeface="Arial" panose="020B0604020202020204" pitchFamily="34" charset="0"/>
+              <a:cs typeface="Arial" panose="020B0604020202020204" pitchFamily="34" charset="0"/>
+              <a:sym typeface="Wingdings" pitchFamily="2" charset="2"/>
+            </a:endParaRPr>
+          </a:p>
+          <a:p>
+            <a:r>
+              <a:rPr lang="en-US" sz="1600" i="1" u="sng" dirty="0">
+                <a:latin typeface="Arial" panose="020B0604020202020204" pitchFamily="34" charset="0"/>
+                <a:cs typeface="Arial" panose="020B0604020202020204" pitchFamily="34" charset="0"/>
+                <a:sym typeface="Wingdings" pitchFamily="2" charset="2"/>
+              </a:rPr>
+              <a:t>Results</a:t>
+            </a:r>
+          </a:p>
+          <a:p>
+            <a:r>
+              <a:rPr lang="en-US" sz="1600" dirty="0">
+                <a:latin typeface="Arial" panose="020B0604020202020204" pitchFamily="34" charset="0"/>
+                <a:cs typeface="Arial" panose="020B0604020202020204" pitchFamily="34" charset="0"/>
+                <a:sym typeface="Wingdings" pitchFamily="2" charset="2"/>
+              </a:rPr>
+              <a:t>Clear subheadings. Result 1 … Result 2 …. Result n</a:t>
+            </a:r>
+          </a:p>
+          <a:p>
+            <a:r>
+              <a:rPr lang="en-US" sz="1600" dirty="0">
+                <a:latin typeface="Arial" panose="020B0604020202020204" pitchFamily="34" charset="0"/>
+                <a:cs typeface="Arial" panose="020B0604020202020204" pitchFamily="34" charset="0"/>
+                <a:sym typeface="Wingdings" pitchFamily="2" charset="2"/>
+              </a:rPr>
+              <a:t>For example: “Metagenomics reveals depletion in microbiome diversity in liver disease patients”</a:t>
+            </a:r>
+          </a:p>
+          <a:p>
+            <a:r>
+              <a:rPr lang="en-US" sz="1600" dirty="0">
+                <a:latin typeface="Arial" panose="020B0604020202020204" pitchFamily="34" charset="0"/>
+                <a:cs typeface="Arial" panose="020B0604020202020204" pitchFamily="34" charset="0"/>
+                <a:sym typeface="Wingdings" pitchFamily="2" charset="2"/>
+              </a:rPr>
+              <a:t>Figures and description of </a:t>
+            </a:r>
+            <a:r>
+              <a:rPr lang="en-US" sz="1600" b="1" dirty="0">
+                <a:latin typeface="Arial" panose="020B0604020202020204" pitchFamily="34" charset="0"/>
+                <a:cs typeface="Arial" panose="020B0604020202020204" pitchFamily="34" charset="0"/>
+                <a:sym typeface="Wingdings" pitchFamily="2" charset="2"/>
+              </a:rPr>
+              <a:t>what you see in the data</a:t>
+            </a:r>
+          </a:p>
+          <a:p>
+            <a:endParaRPr lang="en-US" sz="1600" b="1" dirty="0">
+              <a:latin typeface="Arial" panose="020B0604020202020204" pitchFamily="34" charset="0"/>
+              <a:cs typeface="Arial" panose="020B0604020202020204" pitchFamily="34" charset="0"/>
+              <a:sym typeface="Wingdings" pitchFamily="2" charset="2"/>
+            </a:endParaRPr>
+          </a:p>
+          <a:p>
+            <a:r>
+              <a:rPr lang="en-US" sz="1600" i="1" u="sng" dirty="0">
+                <a:latin typeface="Arial" panose="020B0604020202020204" pitchFamily="34" charset="0"/>
+                <a:cs typeface="Arial" panose="020B0604020202020204" pitchFamily="34" charset="0"/>
+                <a:sym typeface="Wingdings" pitchFamily="2" charset="2"/>
+              </a:rPr>
+              <a:t>Discussion</a:t>
+            </a:r>
+          </a:p>
+          <a:p>
+            <a:r>
+              <a:rPr lang="en-US" sz="1600" dirty="0">
+                <a:latin typeface="Arial" panose="020B0604020202020204" pitchFamily="34" charset="0"/>
+                <a:cs typeface="Arial" panose="020B0604020202020204" pitchFamily="34" charset="0"/>
+                <a:sym typeface="Wingdings" pitchFamily="2" charset="2"/>
+              </a:rPr>
+              <a:t>Put results in broader context of literature and THINK critical about your data. </a:t>
+            </a:r>
+          </a:p>
+          <a:p>
+            <a:endParaRPr lang="en-US" sz="1600" dirty="0">
+              <a:latin typeface="Arial" panose="020B0604020202020204" pitchFamily="34" charset="0"/>
+              <a:cs typeface="Arial" panose="020B0604020202020204" pitchFamily="34" charset="0"/>
+              <a:sym typeface="Wingdings" pitchFamily="2" charset="2"/>
+            </a:endParaRPr>
+          </a:p>
+          <a:p>
+            <a:pPr algn="ctr"/>
+            <a:r>
+              <a:rPr lang="en-US" sz="1600" u="sng" dirty="0">
+                <a:latin typeface="Arial" panose="020B0604020202020204" pitchFamily="34" charset="0"/>
+                <a:cs typeface="Arial" panose="020B0604020202020204" pitchFamily="34" charset="0"/>
+                <a:sym typeface="Wingdings" pitchFamily="2" charset="2"/>
+              </a:rPr>
+              <a:t>This is an MSc course!!!</a:t>
+            </a:r>
+            <a:endParaRPr lang="en-US" sz="1600" u="sng" dirty="0">
+              <a:latin typeface="Arial" panose="020B0604020202020204" pitchFamily="34" charset="0"/>
+              <a:cs typeface="Arial" panose="020B0604020202020204" pitchFamily="34" charset="0"/>
+            </a:endParaRPr>
+          </a:p>
+        </p:txBody>
+      </p:sp>
+    </p:spTree>
+    <p:extLst>
+      <p:ext uri="{BB962C8B-B14F-4D97-AF65-F5344CB8AC3E}">
+        <p14:creationId xmlns:p14="http://schemas.microsoft.com/office/powerpoint/2010/main" val="2871601039"/>
+      </p:ext>
+    </p:extLst>
+  </p:cSld>
+  <p:clrMapOvr>
+    <a:masterClrMapping/>
+  </p:clrMapOvr>
+</p:sld>
+</file>
+
+<file path=ppt/slides/slide11.xml><?xml version="1.0" encoding="utf-8"?>
+<p:sld xmlns:a="http://schemas.openxmlformats.org/drawingml/2006/main" xmlns:r="http://schemas.openxmlformats.org/officeDocument/2006/relationships" xmlns:p="http://schemas.openxmlformats.org/presentationml/2006/main">
+  <p:cSld>
+    <p:spTree>
+      <p:nvGrpSpPr>
+        <p:cNvPr id="1" name=""/>
+        <p:cNvGrpSpPr/>
+        <p:nvPr/>
+      </p:nvGrpSpPr>
+      <p:grpSpPr>
+        <a:xfrm>
+          <a:off x="0" y="0"/>
+          <a:ext cx="0" cy="0"/>
+          <a:chOff x="0" y="0"/>
+          <a:chExt cx="0" cy="0"/>
+        </a:xfrm>
+      </p:grpSpPr>
+      <p:sp>
+        <p:nvSpPr>
+          <p:cNvPr id="2" name="TextBox 1">
+            <a:extLst>
+              <a:ext uri="{FF2B5EF4-FFF2-40B4-BE49-F238E27FC236}">
+                <a16:creationId xmlns:a16="http://schemas.microsoft.com/office/drawing/2014/main" id="{30DFB4F8-02E9-3172-BBD6-CA79A76EC796}"/>
+              </a:ext>
+            </a:extLst>
+          </p:cNvPr>
+          <p:cNvSpPr txBox="1"/>
+          <p:nvPr/>
+        </p:nvSpPr>
+        <p:spPr>
+          <a:xfrm>
+            <a:off x="0" y="441"/>
+            <a:ext cx="12192000" cy="584775"/>
+          </a:xfrm>
+          <a:prstGeom prst="rect">
+            <a:avLst/>
+          </a:prstGeom>
+          <a:noFill/>
+        </p:spPr>
+        <p:txBody>
+          <a:bodyPr wrap="square" rtlCol="0">
+            <a:spAutoFit/>
+          </a:bodyPr>
+          <a:lstStyle/>
+          <a:p>
+            <a:pPr algn="ctr"/>
+            <a:r>
               <a:rPr lang="en-US" sz="3200" dirty="0">
                 <a:latin typeface="Arial" panose="020B0604020202020204" pitchFamily="34" charset="0"/>
                 <a:cs typeface="Arial" panose="020B0604020202020204" pitchFamily="34" charset="0"/>
@@ -4718,7 +5726,7 @@
                 <a:latin typeface="Arial" panose="020B0604020202020204" pitchFamily="34" charset="0"/>
                 <a:cs typeface="Arial" panose="020B0604020202020204" pitchFamily="34" charset="0"/>
               </a:rPr>
-              <a:t>How does your results overlap with the results presented in the original publication? If it does not, describe the reasons why this might be the case based on your knowledge gained in the course thus far.</a:t>
+              <a:t>How does your results overlap with the results presented in the original publication? If it does not, describe the reasons why this might be the case.</a:t>
             </a:r>
           </a:p>
         </p:txBody>
@@ -4727,6 +5735,255 @@
     <p:extLst>
       <p:ext uri="{BB962C8B-B14F-4D97-AF65-F5344CB8AC3E}">
         <p14:creationId xmlns:p14="http://schemas.microsoft.com/office/powerpoint/2010/main" val="4226739858"/>
+      </p:ext>
+    </p:extLst>
+  </p:cSld>
+  <p:clrMapOvr>
+    <a:masterClrMapping/>
+  </p:clrMapOvr>
+</p:sld>
+</file>
+
+<file path=ppt/slides/slide12.xml><?xml version="1.0" encoding="utf-8"?>
+<p:sld xmlns:a="http://schemas.openxmlformats.org/drawingml/2006/main" xmlns:r="http://schemas.openxmlformats.org/officeDocument/2006/relationships" xmlns:p="http://schemas.openxmlformats.org/presentationml/2006/main">
+  <p:cSld>
+    <p:spTree>
+      <p:nvGrpSpPr>
+        <p:cNvPr id="1" name=""/>
+        <p:cNvGrpSpPr/>
+        <p:nvPr/>
+      </p:nvGrpSpPr>
+      <p:grpSpPr>
+        <a:xfrm>
+          <a:off x="0" y="0"/>
+          <a:ext cx="0" cy="0"/>
+          <a:chOff x="0" y="0"/>
+          <a:chExt cx="0" cy="0"/>
+        </a:xfrm>
+      </p:grpSpPr>
+    </p:spTree>
+    <p:extLst>
+      <p:ext uri="{BB962C8B-B14F-4D97-AF65-F5344CB8AC3E}">
+        <p14:creationId xmlns:p14="http://schemas.microsoft.com/office/powerpoint/2010/main" val="393651233"/>
+      </p:ext>
+    </p:extLst>
+  </p:cSld>
+  <p:clrMapOvr>
+    <a:masterClrMapping/>
+  </p:clrMapOvr>
+</p:sld>
+</file>
+
+<file path=ppt/slides/slide13.xml><?xml version="1.0" encoding="utf-8"?>
+<p:sld xmlns:a="http://schemas.openxmlformats.org/drawingml/2006/main" xmlns:r="http://schemas.openxmlformats.org/officeDocument/2006/relationships" xmlns:p="http://schemas.openxmlformats.org/presentationml/2006/main">
+  <p:cSld>
+    <p:spTree>
+      <p:nvGrpSpPr>
+        <p:cNvPr id="1" name=""/>
+        <p:cNvGrpSpPr/>
+        <p:nvPr/>
+      </p:nvGrpSpPr>
+      <p:grpSpPr>
+        <a:xfrm>
+          <a:off x="0" y="0"/>
+          <a:ext cx="0" cy="0"/>
+          <a:chOff x="0" y="0"/>
+          <a:chExt cx="0" cy="0"/>
+        </a:xfrm>
+      </p:grpSpPr>
+      <p:sp>
+        <p:nvSpPr>
+          <p:cNvPr id="2" name="TextBox 1">
+            <a:extLst>
+              <a:ext uri="{FF2B5EF4-FFF2-40B4-BE49-F238E27FC236}">
+                <a16:creationId xmlns:a16="http://schemas.microsoft.com/office/drawing/2014/main" id="{30DFB4F8-02E9-3172-BBD6-CA79A76EC796}"/>
+              </a:ext>
+            </a:extLst>
+          </p:cNvPr>
+          <p:cNvSpPr txBox="1"/>
+          <p:nvPr/>
+        </p:nvSpPr>
+        <p:spPr>
+          <a:xfrm>
+            <a:off x="0" y="441"/>
+            <a:ext cx="12192000" cy="584775"/>
+          </a:xfrm>
+          <a:prstGeom prst="rect">
+            <a:avLst/>
+          </a:prstGeom>
+          <a:noFill/>
+        </p:spPr>
+        <p:txBody>
+          <a:bodyPr wrap="square" rtlCol="0">
+            <a:spAutoFit/>
+          </a:bodyPr>
+          <a:lstStyle/>
+          <a:p>
+            <a:pPr algn="ctr"/>
+            <a:r>
+              <a:rPr lang="en-US" sz="3200" dirty="0">
+                <a:latin typeface="Arial" panose="020B0604020202020204" pitchFamily="34" charset="0"/>
+                <a:cs typeface="Arial" panose="020B0604020202020204" pitchFamily="34" charset="0"/>
+              </a:rPr>
+              <a:t>Log in to CREATE</a:t>
+            </a:r>
+          </a:p>
+        </p:txBody>
+      </p:sp>
+      <p:sp>
+        <p:nvSpPr>
+          <p:cNvPr id="11" name="TextBox 10">
+            <a:extLst>
+              <a:ext uri="{FF2B5EF4-FFF2-40B4-BE49-F238E27FC236}">
+                <a16:creationId xmlns:a16="http://schemas.microsoft.com/office/drawing/2014/main" id="{977BB544-6736-40A9-DDCA-EC7CCF2231A8}"/>
+              </a:ext>
+            </a:extLst>
+          </p:cNvPr>
+          <p:cNvSpPr txBox="1"/>
+          <p:nvPr/>
+        </p:nvSpPr>
+        <p:spPr>
+          <a:xfrm>
+            <a:off x="0" y="991106"/>
+            <a:ext cx="6011917" cy="2031325"/>
+          </a:xfrm>
+          <a:prstGeom prst="rect">
+            <a:avLst/>
+          </a:prstGeom>
+          <a:noFill/>
+        </p:spPr>
+        <p:txBody>
+          <a:bodyPr wrap="square">
+            <a:spAutoFit/>
+          </a:bodyPr>
+          <a:lstStyle/>
+          <a:p>
+            <a:pPr algn="ctr"/>
+            <a:r>
+              <a:rPr lang="en-US" dirty="0">
+                <a:latin typeface="Arial" panose="020B0604020202020204" pitchFamily="34" charset="0"/>
+                <a:cs typeface="Arial" panose="020B0604020202020204" pitchFamily="34" charset="0"/>
+              </a:rPr>
+              <a:t>Windows users</a:t>
+            </a:r>
+          </a:p>
+          <a:p>
+            <a:pPr algn="ctr"/>
+            <a:endParaRPr lang="en-US" dirty="0">
+              <a:latin typeface="Arial" panose="020B0604020202020204" pitchFamily="34" charset="0"/>
+              <a:cs typeface="Arial" panose="020B0604020202020204" pitchFamily="34" charset="0"/>
+            </a:endParaRPr>
+          </a:p>
+          <a:p>
+            <a:pPr marL="342900" indent="-342900" algn="ctr">
+              <a:buAutoNum type="arabicPeriod"/>
+            </a:pPr>
+            <a:r>
+              <a:rPr lang="en-US" dirty="0">
+                <a:latin typeface="Arial" panose="020B0604020202020204" pitchFamily="34" charset="0"/>
+                <a:cs typeface="Arial" panose="020B0604020202020204" pitchFamily="34" charset="0"/>
+              </a:rPr>
+              <a:t>Open </a:t>
+            </a:r>
+            <a:r>
+              <a:rPr lang="en-US" dirty="0" err="1">
+                <a:latin typeface="Arial" panose="020B0604020202020204" pitchFamily="34" charset="0"/>
+                <a:cs typeface="Arial" panose="020B0604020202020204" pitchFamily="34" charset="0"/>
+              </a:rPr>
+              <a:t>MobaXterm</a:t>
+            </a:r>
+            <a:endParaRPr lang="en-US" dirty="0">
+              <a:latin typeface="Arial" panose="020B0604020202020204" pitchFamily="34" charset="0"/>
+              <a:cs typeface="Arial" panose="020B0604020202020204" pitchFamily="34" charset="0"/>
+            </a:endParaRPr>
+          </a:p>
+          <a:p>
+            <a:pPr marL="342900" indent="-342900" algn="ctr">
+              <a:buAutoNum type="arabicPeriod"/>
+            </a:pPr>
+            <a:r>
+              <a:rPr lang="en-US" dirty="0">
+                <a:latin typeface="Arial" panose="020B0604020202020204" pitchFamily="34" charset="0"/>
+                <a:cs typeface="Arial" panose="020B0604020202020204" pitchFamily="34" charset="0"/>
+              </a:rPr>
+              <a:t>Run the command </a:t>
+            </a:r>
+            <a:r>
+              <a:rPr lang="en-US" dirty="0" err="1">
+                <a:latin typeface="Courier New" panose="02070309020205020404" pitchFamily="49" charset="0"/>
+                <a:cs typeface="Courier New" panose="02070309020205020404" pitchFamily="49" charset="0"/>
+              </a:rPr>
+              <a:t>ssh</a:t>
+            </a:r>
+            <a:r>
+              <a:rPr lang="en-US" dirty="0">
+                <a:latin typeface="Courier New" panose="02070309020205020404" pitchFamily="49" charset="0"/>
+                <a:cs typeface="Courier New" panose="02070309020205020404" pitchFamily="49" charset="0"/>
+              </a:rPr>
+              <a:t>-keygen -t </a:t>
+            </a:r>
+            <a:r>
+              <a:rPr lang="en-US" dirty="0" err="1">
+                <a:latin typeface="Courier New" panose="02070309020205020404" pitchFamily="49" charset="0"/>
+                <a:cs typeface="Courier New" panose="02070309020205020404" pitchFamily="49" charset="0"/>
+              </a:rPr>
+              <a:t>rsa</a:t>
+            </a:r>
+            <a:endParaRPr lang="en-US" dirty="0">
+              <a:latin typeface="Arial" panose="020B0604020202020204" pitchFamily="34" charset="0"/>
+              <a:cs typeface="Arial" panose="020B0604020202020204" pitchFamily="34" charset="0"/>
+            </a:endParaRPr>
+          </a:p>
+          <a:p>
+            <a:pPr marL="342900" indent="-342900" algn="ctr">
+              <a:buAutoNum type="arabicPeriod"/>
+            </a:pPr>
+            <a:r>
+              <a:rPr lang="en-US">
+                <a:latin typeface="Arial" panose="020B0604020202020204" pitchFamily="34" charset="0"/>
+                <a:cs typeface="Arial" panose="020B0604020202020204" pitchFamily="34" charset="0"/>
+              </a:rPr>
+              <a:t>Hit Ente</a:t>
+            </a:r>
+            <a:r>
+              <a:rPr lang="en-US" dirty="0">
+                <a:latin typeface="Arial" panose="020B0604020202020204" pitchFamily="34" charset="0"/>
+                <a:cs typeface="Arial" panose="020B0604020202020204" pitchFamily="34" charset="0"/>
+              </a:rPr>
+              <a:t>r</a:t>
+            </a:r>
+            <a:r>
+              <a:rPr lang="en-US">
+                <a:latin typeface="Courier New" panose="02070309020205020404" pitchFamily="49" charset="0"/>
+                <a:cs typeface="Courier New" panose="02070309020205020404" pitchFamily="49" charset="0"/>
+              </a:rPr>
+              <a:t> </a:t>
+            </a:r>
+            <a:endParaRPr lang="en-US" dirty="0">
+              <a:latin typeface="Courier New" panose="02070309020205020404" pitchFamily="49" charset="0"/>
+              <a:cs typeface="Courier New" panose="02070309020205020404" pitchFamily="49" charset="0"/>
+            </a:endParaRPr>
+          </a:p>
+          <a:p>
+            <a:pPr algn="ctr"/>
+            <a:endParaRPr lang="en-US" dirty="0">
+              <a:latin typeface="Arial" panose="020B0604020202020204" pitchFamily="34" charset="0"/>
+              <a:cs typeface="Arial" panose="020B0604020202020204" pitchFamily="34" charset="0"/>
+            </a:endParaRPr>
+          </a:p>
+          <a:p>
+            <a:pPr algn="ctr"/>
+            <a:endParaRPr lang="en-US" dirty="0">
+              <a:latin typeface="Arial" panose="020B0604020202020204" pitchFamily="34" charset="0"/>
+              <a:cs typeface="Arial" panose="020B0604020202020204" pitchFamily="34" charset="0"/>
+            </a:endParaRPr>
+          </a:p>
+        </p:txBody>
+      </p:sp>
+    </p:spTree>
+    <p:extLst>
+      <p:ext uri="{BB962C8B-B14F-4D97-AF65-F5344CB8AC3E}">
+        <p14:creationId xmlns:p14="http://schemas.microsoft.com/office/powerpoint/2010/main" val="3961122419"/>
       </p:ext>
     </p:extLst>
   </p:cSld>
@@ -6125,6 +7382,199 @@
 </file>
 
 <file path=ppt/slides/slide4.xml><?xml version="1.0" encoding="utf-8"?>
+<p:sld xmlns:a="http://schemas.openxmlformats.org/drawingml/2006/main" xmlns:r="http://schemas.openxmlformats.org/officeDocument/2006/relationships" xmlns:p="http://schemas.openxmlformats.org/presentationml/2006/main">
+  <p:cSld>
+    <p:spTree>
+      <p:nvGrpSpPr>
+        <p:cNvPr id="1" name=""/>
+        <p:cNvGrpSpPr/>
+        <p:nvPr/>
+      </p:nvGrpSpPr>
+      <p:grpSpPr>
+        <a:xfrm>
+          <a:off x="0" y="0"/>
+          <a:ext cx="0" cy="0"/>
+          <a:chOff x="0" y="0"/>
+          <a:chExt cx="0" cy="0"/>
+        </a:xfrm>
+      </p:grpSpPr>
+      <p:sp>
+        <p:nvSpPr>
+          <p:cNvPr id="2" name="TextBox 1">
+            <a:extLst>
+              <a:ext uri="{FF2B5EF4-FFF2-40B4-BE49-F238E27FC236}">
+                <a16:creationId xmlns:a16="http://schemas.microsoft.com/office/drawing/2014/main" id="{30DFB4F8-02E9-3172-BBD6-CA79A76EC796}"/>
+              </a:ext>
+            </a:extLst>
+          </p:cNvPr>
+          <p:cNvSpPr txBox="1"/>
+          <p:nvPr/>
+        </p:nvSpPr>
+        <p:spPr>
+          <a:xfrm>
+            <a:off x="0" y="441"/>
+            <a:ext cx="12192000" cy="584775"/>
+          </a:xfrm>
+          <a:prstGeom prst="rect">
+            <a:avLst/>
+          </a:prstGeom>
+          <a:noFill/>
+        </p:spPr>
+        <p:txBody>
+          <a:bodyPr wrap="square" rtlCol="0">
+            <a:spAutoFit/>
+          </a:bodyPr>
+          <a:lstStyle/>
+          <a:p>
+            <a:pPr algn="ctr"/>
+            <a:r>
+              <a:rPr lang="en-US" sz="3200" u="sng" dirty="0">
+                <a:latin typeface="Arial" panose="020B0604020202020204" pitchFamily="34" charset="0"/>
+                <a:cs typeface="Arial" panose="020B0604020202020204" pitchFamily="34" charset="0"/>
+              </a:rPr>
+              <a:t>Metagenomics overview</a:t>
+            </a:r>
+          </a:p>
+        </p:txBody>
+      </p:sp>
+      <p:pic>
+        <p:nvPicPr>
+          <p:cNvPr id="4098" name="Picture 2" descr="Shotgun metagenomics, from sampling to analysis | Nature Biotechnology">
+            <a:extLst>
+              <a:ext uri="{FF2B5EF4-FFF2-40B4-BE49-F238E27FC236}">
+                <a16:creationId xmlns:a16="http://schemas.microsoft.com/office/drawing/2014/main" id="{7F3B5116-B9F0-7226-40A5-37BB92946F36}"/>
+              </a:ext>
+            </a:extLst>
+          </p:cNvPr>
+          <p:cNvPicPr>
+            <a:picLocks noChangeAspect="1" noChangeArrowheads="1"/>
+          </p:cNvPicPr>
+          <p:nvPr/>
+        </p:nvPicPr>
+        <p:blipFill>
+          <a:blip r:embed="rId3">
+            <a:extLst>
+              <a:ext uri="{28A0092B-C50C-407E-A947-70E740481C1C}">
+                <a14:useLocalDpi xmlns:a14="http://schemas.microsoft.com/office/drawing/2010/main" val="0"/>
+              </a:ext>
+            </a:extLst>
+          </a:blip>
+          <a:srcRect/>
+          <a:stretch>
+            <a:fillRect/>
+          </a:stretch>
+        </p:blipFill>
+        <p:spPr bwMode="auto">
+          <a:xfrm>
+            <a:off x="234727" y="1442379"/>
+            <a:ext cx="6482339" cy="4707296"/>
+          </a:xfrm>
+          <a:prstGeom prst="rect">
+            <a:avLst/>
+          </a:prstGeom>
+          <a:noFill/>
+          <a:extLst>
+            <a:ext uri="{909E8E84-426E-40DD-AFC4-6F175D3DCCD1}">
+              <a14:hiddenFill xmlns:a14="http://schemas.microsoft.com/office/drawing/2010/main">
+                <a:solidFill>
+                  <a:srgbClr val="FFFFFF"/>
+                </a:solidFill>
+              </a14:hiddenFill>
+            </a:ext>
+          </a:extLst>
+        </p:spPr>
+      </p:pic>
+      <p:sp>
+        <p:nvSpPr>
+          <p:cNvPr id="17" name="TextBox 16">
+            <a:extLst>
+              <a:ext uri="{FF2B5EF4-FFF2-40B4-BE49-F238E27FC236}">
+                <a16:creationId xmlns:a16="http://schemas.microsoft.com/office/drawing/2014/main" id="{BABF849A-E5B8-8CC8-68A5-9A727CA54A7B}"/>
+              </a:ext>
+            </a:extLst>
+          </p:cNvPr>
+          <p:cNvSpPr txBox="1"/>
+          <p:nvPr/>
+        </p:nvSpPr>
+        <p:spPr>
+          <a:xfrm>
+            <a:off x="0" y="6519446"/>
+            <a:ext cx="4017446" cy="338554"/>
+          </a:xfrm>
+          <a:prstGeom prst="rect">
+            <a:avLst/>
+          </a:prstGeom>
+          <a:noFill/>
+        </p:spPr>
+        <p:txBody>
+          <a:bodyPr wrap="none" rtlCol="0">
+            <a:spAutoFit/>
+          </a:bodyPr>
+          <a:lstStyle/>
+          <a:p>
+            <a:r>
+              <a:rPr lang="en-US" sz="1600" dirty="0">
+                <a:latin typeface="Arial" panose="020B0604020202020204" pitchFamily="34" charset="0"/>
+                <a:cs typeface="Arial" panose="020B0604020202020204" pitchFamily="34" charset="0"/>
+              </a:rPr>
+              <a:t>Quince et a., Nature Biotechnology (2017)</a:t>
+            </a:r>
+          </a:p>
+        </p:txBody>
+      </p:sp>
+      <p:sp>
+        <p:nvSpPr>
+          <p:cNvPr id="19" name="TextBox 18">
+            <a:extLst>
+              <a:ext uri="{FF2B5EF4-FFF2-40B4-BE49-F238E27FC236}">
+                <a16:creationId xmlns:a16="http://schemas.microsoft.com/office/drawing/2014/main" id="{544EB104-F8B0-016B-CBC3-F63B961CD4DC}"/>
+              </a:ext>
+            </a:extLst>
+          </p:cNvPr>
+          <p:cNvSpPr txBox="1"/>
+          <p:nvPr/>
+        </p:nvSpPr>
+        <p:spPr>
+          <a:xfrm>
+            <a:off x="1174530" y="955623"/>
+            <a:ext cx="4745421" cy="461665"/>
+          </a:xfrm>
+          <a:prstGeom prst="rect">
+            <a:avLst/>
+          </a:prstGeom>
+          <a:noFill/>
+        </p:spPr>
+        <p:txBody>
+          <a:bodyPr wrap="square" rtlCol="0">
+            <a:spAutoFit/>
+          </a:bodyPr>
+          <a:lstStyle/>
+          <a:p>
+            <a:pPr algn="ctr"/>
+            <a:r>
+              <a:rPr lang="en-US" sz="1200" i="1" dirty="0">
+                <a:latin typeface="Arial" panose="020B0604020202020204" pitchFamily="34" charset="0"/>
+                <a:cs typeface="Arial" panose="020B0604020202020204" pitchFamily="34" charset="0"/>
+              </a:rPr>
+              <a:t>Different methodologies for each step with advantages and disadvantages </a:t>
+            </a:r>
+          </a:p>
+        </p:txBody>
+      </p:sp>
+    </p:spTree>
+    <p:extLst>
+      <p:ext uri="{BB962C8B-B14F-4D97-AF65-F5344CB8AC3E}">
+        <p14:creationId xmlns:p14="http://schemas.microsoft.com/office/powerpoint/2010/main" val="3817458232"/>
+      </p:ext>
+    </p:extLst>
+  </p:cSld>
+  <p:clrMapOvr>
+    <a:masterClrMapping/>
+  </p:clrMapOvr>
+</p:sld>
+</file>
+
+<file path=ppt/slides/slide5.xml><?xml version="1.0" encoding="utf-8"?>
 <p:sld xmlns:a="http://schemas.openxmlformats.org/drawingml/2006/main" xmlns:r="http://schemas.openxmlformats.org/officeDocument/2006/relationships" xmlns:p="http://schemas.openxmlformats.org/presentationml/2006/main">
   <p:cSld>
     <p:spTree>
@@ -8065,7 +9515,732 @@
 </p:sld>
 </file>
 
-<file path=ppt/slides/slide5.xml><?xml version="1.0" encoding="utf-8"?>
+<file path=ppt/slides/slide6.xml><?xml version="1.0" encoding="utf-8"?>
+<p:sld xmlns:a="http://schemas.openxmlformats.org/drawingml/2006/main" xmlns:r="http://schemas.openxmlformats.org/officeDocument/2006/relationships" xmlns:p="http://schemas.openxmlformats.org/presentationml/2006/main">
+  <p:cSld>
+    <p:spTree>
+      <p:nvGrpSpPr>
+        <p:cNvPr id="1" name=""/>
+        <p:cNvGrpSpPr/>
+        <p:nvPr/>
+      </p:nvGrpSpPr>
+      <p:grpSpPr>
+        <a:xfrm>
+          <a:off x="0" y="0"/>
+          <a:ext cx="0" cy="0"/>
+          <a:chOff x="0" y="0"/>
+          <a:chExt cx="0" cy="0"/>
+        </a:xfrm>
+      </p:grpSpPr>
+      <p:sp>
+        <p:nvSpPr>
+          <p:cNvPr id="2" name="TextBox 1">
+            <a:extLst>
+              <a:ext uri="{FF2B5EF4-FFF2-40B4-BE49-F238E27FC236}">
+                <a16:creationId xmlns:a16="http://schemas.microsoft.com/office/drawing/2014/main" id="{30DFB4F8-02E9-3172-BBD6-CA79A76EC796}"/>
+              </a:ext>
+            </a:extLst>
+          </p:cNvPr>
+          <p:cNvSpPr txBox="1"/>
+          <p:nvPr/>
+        </p:nvSpPr>
+        <p:spPr>
+          <a:xfrm>
+            <a:off x="0" y="441"/>
+            <a:ext cx="12192000" cy="584775"/>
+          </a:xfrm>
+          <a:prstGeom prst="rect">
+            <a:avLst/>
+          </a:prstGeom>
+          <a:noFill/>
+        </p:spPr>
+        <p:txBody>
+          <a:bodyPr wrap="square" rtlCol="0">
+            <a:spAutoFit/>
+          </a:bodyPr>
+          <a:lstStyle/>
+          <a:p>
+            <a:pPr algn="ctr"/>
+            <a:r>
+              <a:rPr lang="en-US" sz="3200" u="sng" dirty="0">
+                <a:latin typeface="Arial" panose="020B0604020202020204" pitchFamily="34" charset="0"/>
+                <a:cs typeface="Arial" panose="020B0604020202020204" pitchFamily="34" charset="0"/>
+              </a:rPr>
+              <a:t>Workshop tools</a:t>
+            </a:r>
+          </a:p>
+        </p:txBody>
+      </p:sp>
+      <p:pic>
+        <p:nvPicPr>
+          <p:cNvPr id="3" name="Picture 2" descr="A screenshot of a computer&#10;&#10;Description automatically generated">
+            <a:extLst>
+              <a:ext uri="{FF2B5EF4-FFF2-40B4-BE49-F238E27FC236}">
+                <a16:creationId xmlns:a16="http://schemas.microsoft.com/office/drawing/2014/main" id="{14E15456-7E4E-375B-E0B8-7F1C3E72D454}"/>
+              </a:ext>
+            </a:extLst>
+          </p:cNvPr>
+          <p:cNvPicPr>
+            <a:picLocks noChangeAspect="1"/>
+          </p:cNvPicPr>
+          <p:nvPr/>
+        </p:nvPicPr>
+        <p:blipFill>
+          <a:blip r:embed="rId3"/>
+          <a:stretch>
+            <a:fillRect/>
+          </a:stretch>
+        </p:blipFill>
+        <p:spPr>
+          <a:xfrm>
+            <a:off x="381005" y="1854679"/>
+            <a:ext cx="5842458" cy="2424864"/>
+          </a:xfrm>
+          <a:prstGeom prst="rect">
+            <a:avLst/>
+          </a:prstGeom>
+          <a:ln>
+            <a:solidFill>
+              <a:schemeClr val="tx1"/>
+            </a:solidFill>
+          </a:ln>
+        </p:spPr>
+      </p:pic>
+      <p:sp>
+        <p:nvSpPr>
+          <p:cNvPr id="4" name="TextBox 3">
+            <a:extLst>
+              <a:ext uri="{FF2B5EF4-FFF2-40B4-BE49-F238E27FC236}">
+                <a16:creationId xmlns:a16="http://schemas.microsoft.com/office/drawing/2014/main" id="{16EBBD61-19BB-DB15-24B7-686D17E77719}"/>
+              </a:ext>
+            </a:extLst>
+          </p:cNvPr>
+          <p:cNvSpPr txBox="1"/>
+          <p:nvPr/>
+        </p:nvSpPr>
+        <p:spPr>
+          <a:xfrm>
+            <a:off x="253542" y="4463505"/>
+            <a:ext cx="6097384" cy="646331"/>
+          </a:xfrm>
+          <a:prstGeom prst="rect">
+            <a:avLst/>
+          </a:prstGeom>
+          <a:noFill/>
+        </p:spPr>
+        <p:txBody>
+          <a:bodyPr wrap="square">
+            <a:spAutoFit/>
+          </a:bodyPr>
+          <a:lstStyle/>
+          <a:p>
+            <a:pPr algn="ctr"/>
+            <a:r>
+              <a:rPr lang="en-US" dirty="0">
+                <a:latin typeface="Arial" panose="020B0604020202020204" pitchFamily="34" charset="0"/>
+                <a:cs typeface="Arial" panose="020B0604020202020204" pitchFamily="34" charset="0"/>
+              </a:rPr>
+              <a:t>Please read the publication here:</a:t>
+            </a:r>
+          </a:p>
+          <a:p>
+            <a:pPr algn="ctr"/>
+            <a:r>
+              <a:rPr lang="en-US" dirty="0">
+                <a:latin typeface="Arial" panose="020B0604020202020204" pitchFamily="34" charset="0"/>
+                <a:cs typeface="Arial" panose="020B0604020202020204" pitchFamily="34" charset="0"/>
+              </a:rPr>
+              <a:t>https://</a:t>
+            </a:r>
+            <a:r>
+              <a:rPr lang="en-US" dirty="0" err="1">
+                <a:latin typeface="Arial" panose="020B0604020202020204" pitchFamily="34" charset="0"/>
+                <a:cs typeface="Arial" panose="020B0604020202020204" pitchFamily="34" charset="0"/>
+              </a:rPr>
+              <a:t>www.nature.com</a:t>
+            </a:r>
+            <a:r>
+              <a:rPr lang="en-US" dirty="0">
+                <a:latin typeface="Arial" panose="020B0604020202020204" pitchFamily="34" charset="0"/>
+                <a:cs typeface="Arial" panose="020B0604020202020204" pitchFamily="34" charset="0"/>
+              </a:rPr>
+              <a:t>/articles/nature13568</a:t>
+            </a:r>
+          </a:p>
+        </p:txBody>
+      </p:sp>
+      <p:sp>
+        <p:nvSpPr>
+          <p:cNvPr id="5" name="TextBox 4">
+            <a:extLst>
+              <a:ext uri="{FF2B5EF4-FFF2-40B4-BE49-F238E27FC236}">
+                <a16:creationId xmlns:a16="http://schemas.microsoft.com/office/drawing/2014/main" id="{D846CAE6-D8E0-4CFD-CA50-5E139EE9A4D1}"/>
+              </a:ext>
+            </a:extLst>
+          </p:cNvPr>
+          <p:cNvSpPr txBox="1"/>
+          <p:nvPr/>
+        </p:nvSpPr>
+        <p:spPr>
+          <a:xfrm>
+            <a:off x="1745364" y="944890"/>
+            <a:ext cx="2858814" cy="584775"/>
+          </a:xfrm>
+          <a:prstGeom prst="rect">
+            <a:avLst/>
+          </a:prstGeom>
+          <a:noFill/>
+        </p:spPr>
+        <p:txBody>
+          <a:bodyPr wrap="square">
+            <a:spAutoFit/>
+          </a:bodyPr>
+          <a:lstStyle/>
+          <a:p>
+            <a:pPr algn="ctr"/>
+            <a:r>
+              <a:rPr lang="en-GB" sz="3200" b="0" i="0" dirty="0">
+                <a:effectLst/>
+                <a:latin typeface="Arial" panose="020B0604020202020204" pitchFamily="34" charset="0"/>
+                <a:cs typeface="Arial" panose="020B0604020202020204" pitchFamily="34" charset="0"/>
+              </a:rPr>
+              <a:t>Dataset</a:t>
+            </a:r>
+            <a:endParaRPr lang="en-US" sz="3200" dirty="0">
+              <a:latin typeface="Arial" panose="020B0604020202020204" pitchFamily="34" charset="0"/>
+              <a:cs typeface="Arial" panose="020B0604020202020204" pitchFamily="34" charset="0"/>
+            </a:endParaRPr>
+          </a:p>
+        </p:txBody>
+      </p:sp>
+      <p:sp>
+        <p:nvSpPr>
+          <p:cNvPr id="6" name="TextBox 5">
+            <a:extLst>
+              <a:ext uri="{FF2B5EF4-FFF2-40B4-BE49-F238E27FC236}">
+                <a16:creationId xmlns:a16="http://schemas.microsoft.com/office/drawing/2014/main" id="{7014E209-6E3B-6227-80A3-AE6808AD6838}"/>
+              </a:ext>
+            </a:extLst>
+          </p:cNvPr>
+          <p:cNvSpPr txBox="1"/>
+          <p:nvPr/>
+        </p:nvSpPr>
+        <p:spPr>
+          <a:xfrm>
+            <a:off x="7699474" y="944890"/>
+            <a:ext cx="2858814" cy="584775"/>
+          </a:xfrm>
+          <a:prstGeom prst="rect">
+            <a:avLst/>
+          </a:prstGeom>
+          <a:noFill/>
+        </p:spPr>
+        <p:txBody>
+          <a:bodyPr wrap="square">
+            <a:spAutoFit/>
+          </a:bodyPr>
+          <a:lstStyle/>
+          <a:p>
+            <a:pPr algn="ctr"/>
+            <a:r>
+              <a:rPr lang="en-GB" sz="3200" b="0" i="0" dirty="0">
+                <a:effectLst/>
+                <a:latin typeface="Arial" panose="020B0604020202020204" pitchFamily="34" charset="0"/>
+                <a:cs typeface="Arial" panose="020B0604020202020204" pitchFamily="34" charset="0"/>
+              </a:rPr>
+              <a:t>Tools</a:t>
+            </a:r>
+            <a:endParaRPr lang="en-US" sz="3200" dirty="0">
+              <a:latin typeface="Arial" panose="020B0604020202020204" pitchFamily="34" charset="0"/>
+              <a:cs typeface="Arial" panose="020B0604020202020204" pitchFamily="34" charset="0"/>
+            </a:endParaRPr>
+          </a:p>
+        </p:txBody>
+      </p:sp>
+      <p:pic>
+        <p:nvPicPr>
+          <p:cNvPr id="7" name="Picture 4" descr="Server - Definition and details">
+            <a:extLst>
+              <a:ext uri="{FF2B5EF4-FFF2-40B4-BE49-F238E27FC236}">
+                <a16:creationId xmlns:a16="http://schemas.microsoft.com/office/drawing/2014/main" id="{B9E00764-96C6-14CC-5469-3DA8593DBFCA}"/>
+              </a:ext>
+            </a:extLst>
+          </p:cNvPr>
+          <p:cNvPicPr>
+            <a:picLocks noChangeAspect="1" noChangeArrowheads="1"/>
+          </p:cNvPicPr>
+          <p:nvPr/>
+        </p:nvPicPr>
+        <p:blipFill>
+          <a:blip r:embed="rId4">
+            <a:extLst>
+              <a:ext uri="{28A0092B-C50C-407E-A947-70E740481C1C}">
+                <a14:useLocalDpi xmlns:a14="http://schemas.microsoft.com/office/drawing/2010/main" val="0"/>
+              </a:ext>
+            </a:extLst>
+          </a:blip>
+          <a:srcRect/>
+          <a:stretch>
+            <a:fillRect/>
+          </a:stretch>
+        </p:blipFill>
+        <p:spPr bwMode="auto">
+          <a:xfrm>
+            <a:off x="7468477" y="1854679"/>
+            <a:ext cx="1601951" cy="1359032"/>
+          </a:xfrm>
+          <a:prstGeom prst="rect">
+            <a:avLst/>
+          </a:prstGeom>
+          <a:noFill/>
+          <a:extLst>
+            <a:ext uri="{909E8E84-426E-40DD-AFC4-6F175D3DCCD1}">
+              <a14:hiddenFill xmlns:a14="http://schemas.microsoft.com/office/drawing/2010/main">
+                <a:solidFill>
+                  <a:srgbClr val="FFFFFF"/>
+                </a:solidFill>
+              </a14:hiddenFill>
+            </a:ext>
+          </a:extLst>
+        </p:spPr>
+      </p:pic>
+      <p:pic>
+        <p:nvPicPr>
+          <p:cNvPr id="8" name="Picture 7" descr="http://www.muylinux.com/wp-content/uploads/2009/04/logos-distros.jpg">
+            <a:extLst>
+              <a:ext uri="{FF2B5EF4-FFF2-40B4-BE49-F238E27FC236}">
+                <a16:creationId xmlns:a16="http://schemas.microsoft.com/office/drawing/2014/main" id="{FD097DB3-83FF-B3D0-3AA5-32A27D894E18}"/>
+              </a:ext>
+            </a:extLst>
+          </p:cNvPr>
+          <p:cNvPicPr>
+            <a:picLocks noChangeAspect="1" noChangeArrowheads="1"/>
+          </p:cNvPicPr>
+          <p:nvPr/>
+        </p:nvPicPr>
+        <p:blipFill rotWithShape="1">
+          <a:blip r:embed="rId5">
+            <a:extLst>
+              <a:ext uri="{28A0092B-C50C-407E-A947-70E740481C1C}">
+                <a14:useLocalDpi xmlns:a14="http://schemas.microsoft.com/office/drawing/2010/main" val="0"/>
+              </a:ext>
+            </a:extLst>
+          </a:blip>
+          <a:srcRect l="51715" t="78014" r="38823" b="4256"/>
+          <a:stretch/>
+        </p:blipFill>
+        <p:spPr bwMode="auto">
+          <a:xfrm>
+            <a:off x="9522359" y="1854679"/>
+            <a:ext cx="1193414" cy="1134000"/>
+          </a:xfrm>
+          <a:prstGeom prst="rect">
+            <a:avLst/>
+          </a:prstGeom>
+          <a:noFill/>
+          <a:extLst>
+            <a:ext uri="{909E8E84-426E-40DD-AFC4-6F175D3DCCD1}">
+              <a14:hiddenFill xmlns:a14="http://schemas.microsoft.com/office/drawing/2010/main">
+                <a:solidFill>
+                  <a:srgbClr val="FFFFFF"/>
+                </a:solidFill>
+              </a14:hiddenFill>
+            </a:ext>
+          </a:extLst>
+        </p:spPr>
+      </p:pic>
+      <p:pic>
+        <p:nvPicPr>
+          <p:cNvPr id="9" name="Picture 6" descr="R (programming language) - Wikipedia">
+            <a:extLst>
+              <a:ext uri="{FF2B5EF4-FFF2-40B4-BE49-F238E27FC236}">
+                <a16:creationId xmlns:a16="http://schemas.microsoft.com/office/drawing/2014/main" id="{15DB65A3-F9A7-784E-4A27-FCBA5A956C65}"/>
+              </a:ext>
+            </a:extLst>
+          </p:cNvPr>
+          <p:cNvPicPr>
+            <a:picLocks noChangeAspect="1" noChangeArrowheads="1"/>
+          </p:cNvPicPr>
+          <p:nvPr/>
+        </p:nvPicPr>
+        <p:blipFill>
+          <a:blip r:embed="rId6">
+            <a:extLst>
+              <a:ext uri="{28A0092B-C50C-407E-A947-70E740481C1C}">
+                <a14:useLocalDpi xmlns:a14="http://schemas.microsoft.com/office/drawing/2010/main" val="0"/>
+              </a:ext>
+            </a:extLst>
+          </a:blip>
+          <a:srcRect/>
+          <a:stretch>
+            <a:fillRect/>
+          </a:stretch>
+        </p:blipFill>
+        <p:spPr bwMode="auto">
+          <a:xfrm>
+            <a:off x="7753203" y="3668153"/>
+            <a:ext cx="1769156" cy="1371143"/>
+          </a:xfrm>
+          <a:prstGeom prst="rect">
+            <a:avLst/>
+          </a:prstGeom>
+          <a:noFill/>
+          <a:extLst>
+            <a:ext uri="{909E8E84-426E-40DD-AFC4-6F175D3DCCD1}">
+              <a14:hiddenFill xmlns:a14="http://schemas.microsoft.com/office/drawing/2010/main">
+                <a:solidFill>
+                  <a:srgbClr val="FFFFFF"/>
+                </a:solidFill>
+              </a14:hiddenFill>
+            </a:ext>
+          </a:extLst>
+        </p:spPr>
+      </p:pic>
+      <p:pic>
+        <p:nvPicPr>
+          <p:cNvPr id="10" name="Picture 9" descr="A computer screen with a black screen&#10;&#10;Description automatically generated">
+            <a:extLst>
+              <a:ext uri="{FF2B5EF4-FFF2-40B4-BE49-F238E27FC236}">
+                <a16:creationId xmlns:a16="http://schemas.microsoft.com/office/drawing/2014/main" id="{FDAC00B2-18D0-2EBB-C713-BB47D8F8B6B2}"/>
+              </a:ext>
+            </a:extLst>
+          </p:cNvPr>
+          <p:cNvPicPr>
+            <a:picLocks noChangeAspect="1"/>
+          </p:cNvPicPr>
+          <p:nvPr/>
+        </p:nvPicPr>
+        <p:blipFill rotWithShape="1">
+          <a:blip r:embed="rId7"/>
+          <a:srcRect l="9283" t="1990" r="32765" b="33783"/>
+          <a:stretch/>
+        </p:blipFill>
+        <p:spPr>
+          <a:xfrm>
+            <a:off x="9591154" y="3151640"/>
+            <a:ext cx="1763101" cy="1202084"/>
+          </a:xfrm>
+          <a:prstGeom prst="rect">
+            <a:avLst/>
+          </a:prstGeom>
+          <a:ln w="28575">
+            <a:solidFill>
+              <a:schemeClr val="tx1"/>
+            </a:solidFill>
+          </a:ln>
+        </p:spPr>
+      </p:pic>
+      <p:sp>
+        <p:nvSpPr>
+          <p:cNvPr id="11" name="TextBox 10">
+            <a:extLst>
+              <a:ext uri="{FF2B5EF4-FFF2-40B4-BE49-F238E27FC236}">
+                <a16:creationId xmlns:a16="http://schemas.microsoft.com/office/drawing/2014/main" id="{1D520968-348D-7513-5D84-35A2770158C7}"/>
+              </a:ext>
+            </a:extLst>
+          </p:cNvPr>
+          <p:cNvSpPr txBox="1"/>
+          <p:nvPr/>
+        </p:nvSpPr>
+        <p:spPr>
+          <a:xfrm>
+            <a:off x="3302234" y="5882605"/>
+            <a:ext cx="6097384" cy="646331"/>
+          </a:xfrm>
+          <a:prstGeom prst="rect">
+            <a:avLst/>
+          </a:prstGeom>
+          <a:noFill/>
+        </p:spPr>
+        <p:txBody>
+          <a:bodyPr wrap="square">
+            <a:spAutoFit/>
+          </a:bodyPr>
+          <a:lstStyle/>
+          <a:p>
+            <a:pPr algn="ctr"/>
+            <a:r>
+              <a:rPr lang="en-US" dirty="0">
+                <a:latin typeface="Arial" panose="020B0604020202020204" pitchFamily="34" charset="0"/>
+                <a:cs typeface="Arial" panose="020B0604020202020204" pitchFamily="34" charset="0"/>
+              </a:rPr>
+              <a:t>All the materials are on GitHub:</a:t>
+            </a:r>
+          </a:p>
+          <a:p>
+            <a:pPr algn="ctr"/>
+            <a:endParaRPr lang="en-US" dirty="0">
+              <a:latin typeface="Arial" panose="020B0604020202020204" pitchFamily="34" charset="0"/>
+              <a:cs typeface="Arial" panose="020B0604020202020204" pitchFamily="34" charset="0"/>
+            </a:endParaRPr>
+          </a:p>
+        </p:txBody>
+      </p:sp>
+    </p:spTree>
+    <p:extLst>
+      <p:ext uri="{BB962C8B-B14F-4D97-AF65-F5344CB8AC3E}">
+        <p14:creationId xmlns:p14="http://schemas.microsoft.com/office/powerpoint/2010/main" val="1894717210"/>
+      </p:ext>
+    </p:extLst>
+  </p:cSld>
+  <p:clrMapOvr>
+    <a:masterClrMapping/>
+  </p:clrMapOvr>
+</p:sld>
+</file>
+
+<file path=ppt/slides/slide7.xml><?xml version="1.0" encoding="utf-8"?>
+<p:sld xmlns:a="http://schemas.openxmlformats.org/drawingml/2006/main" xmlns:r="http://schemas.openxmlformats.org/officeDocument/2006/relationships" xmlns:p="http://schemas.openxmlformats.org/presentationml/2006/main">
+  <p:cSld>
+    <p:spTree>
+      <p:nvGrpSpPr>
+        <p:cNvPr id="1" name=""/>
+        <p:cNvGrpSpPr/>
+        <p:nvPr/>
+      </p:nvGrpSpPr>
+      <p:grpSpPr>
+        <a:xfrm>
+          <a:off x="0" y="0"/>
+          <a:ext cx="0" cy="0"/>
+          <a:chOff x="0" y="0"/>
+          <a:chExt cx="0" cy="0"/>
+        </a:xfrm>
+      </p:grpSpPr>
+      <p:sp>
+        <p:nvSpPr>
+          <p:cNvPr id="2" name="TextBox 1">
+            <a:extLst>
+              <a:ext uri="{FF2B5EF4-FFF2-40B4-BE49-F238E27FC236}">
+                <a16:creationId xmlns:a16="http://schemas.microsoft.com/office/drawing/2014/main" id="{30DFB4F8-02E9-3172-BBD6-CA79A76EC796}"/>
+              </a:ext>
+            </a:extLst>
+          </p:cNvPr>
+          <p:cNvSpPr txBox="1"/>
+          <p:nvPr/>
+        </p:nvSpPr>
+        <p:spPr>
+          <a:xfrm>
+            <a:off x="0" y="441"/>
+            <a:ext cx="12192000" cy="584775"/>
+          </a:xfrm>
+          <a:prstGeom prst="rect">
+            <a:avLst/>
+          </a:prstGeom>
+          <a:noFill/>
+        </p:spPr>
+        <p:txBody>
+          <a:bodyPr wrap="square" rtlCol="0">
+            <a:spAutoFit/>
+          </a:bodyPr>
+          <a:lstStyle/>
+          <a:p>
+            <a:pPr algn="ctr"/>
+            <a:r>
+              <a:rPr lang="en-US" sz="3200" u="sng" dirty="0">
+                <a:latin typeface="Arial" panose="020B0604020202020204" pitchFamily="34" charset="0"/>
+                <a:cs typeface="Arial" panose="020B0604020202020204" pitchFamily="34" charset="0"/>
+              </a:rPr>
+              <a:t>Using virtual environments</a:t>
+            </a:r>
+          </a:p>
+        </p:txBody>
+      </p:sp>
+      <p:pic>
+        <p:nvPicPr>
+          <p:cNvPr id="6146" name="Picture 2" descr="Schedule - scRNAseq course">
+            <a:extLst>
+              <a:ext uri="{FF2B5EF4-FFF2-40B4-BE49-F238E27FC236}">
+                <a16:creationId xmlns:a16="http://schemas.microsoft.com/office/drawing/2014/main" id="{7179E1D3-728E-AC2B-B670-2A6BDE28D2F8}"/>
+              </a:ext>
+            </a:extLst>
+          </p:cNvPr>
+          <p:cNvPicPr>
+            <a:picLocks noChangeAspect="1" noChangeArrowheads="1"/>
+          </p:cNvPicPr>
+          <p:nvPr/>
+        </p:nvPicPr>
+        <p:blipFill>
+          <a:blip r:embed="rId3">
+            <a:extLst>
+              <a:ext uri="{28A0092B-C50C-407E-A947-70E740481C1C}">
+                <a14:useLocalDpi xmlns:a14="http://schemas.microsoft.com/office/drawing/2010/main" val="0"/>
+              </a:ext>
+            </a:extLst>
+          </a:blip>
+          <a:srcRect/>
+          <a:stretch>
+            <a:fillRect/>
+          </a:stretch>
+        </p:blipFill>
+        <p:spPr bwMode="auto">
+          <a:xfrm>
+            <a:off x="157655" y="1994308"/>
+            <a:ext cx="6022428" cy="3100609"/>
+          </a:xfrm>
+          <a:prstGeom prst="rect">
+            <a:avLst/>
+          </a:prstGeom>
+          <a:noFill/>
+          <a:extLst>
+            <a:ext uri="{909E8E84-426E-40DD-AFC4-6F175D3DCCD1}">
+              <a14:hiddenFill xmlns:a14="http://schemas.microsoft.com/office/drawing/2010/main">
+                <a:solidFill>
+                  <a:srgbClr val="FFFFFF"/>
+                </a:solidFill>
+              </a14:hiddenFill>
+            </a:ext>
+          </a:extLst>
+        </p:spPr>
+      </p:pic>
+      <p:sp>
+        <p:nvSpPr>
+          <p:cNvPr id="7" name="TextBox 6">
+            <a:extLst>
+              <a:ext uri="{FF2B5EF4-FFF2-40B4-BE49-F238E27FC236}">
+                <a16:creationId xmlns:a16="http://schemas.microsoft.com/office/drawing/2014/main" id="{21822919-A866-682B-0E9F-2ADA4479056F}"/>
+              </a:ext>
+            </a:extLst>
+          </p:cNvPr>
+          <p:cNvSpPr txBox="1"/>
+          <p:nvPr/>
+        </p:nvSpPr>
+        <p:spPr>
+          <a:xfrm>
+            <a:off x="804042" y="711340"/>
+            <a:ext cx="10583916" cy="646331"/>
+          </a:xfrm>
+          <a:prstGeom prst="rect">
+            <a:avLst/>
+          </a:prstGeom>
+          <a:noFill/>
+        </p:spPr>
+        <p:txBody>
+          <a:bodyPr wrap="square">
+            <a:spAutoFit/>
+          </a:bodyPr>
+          <a:lstStyle/>
+          <a:p>
+            <a:pPr algn="ctr"/>
+            <a:r>
+              <a:rPr lang="en-GB" dirty="0">
+                <a:effectLst/>
+                <a:latin typeface="Arial" panose="020B0604020202020204" pitchFamily="34" charset="0"/>
+                <a:cs typeface="Arial" panose="020B0604020202020204" pitchFamily="34" charset="0"/>
+              </a:rPr>
+              <a:t>A virtual environment is a tool that helps to keep dependencies required by different projects separate by creating an isolated virtual environment for them.</a:t>
+            </a:r>
+            <a:endParaRPr lang="en-US" dirty="0">
+              <a:latin typeface="Arial" panose="020B0604020202020204" pitchFamily="34" charset="0"/>
+              <a:cs typeface="Arial" panose="020B0604020202020204" pitchFamily="34" charset="0"/>
+            </a:endParaRPr>
+          </a:p>
+        </p:txBody>
+      </p:sp>
+      <p:pic>
+        <p:nvPicPr>
+          <p:cNvPr id="6148" name="Picture 4" descr="Getting Started with Conda. Just the basics. What is Conda? Why… | by David  R. Pugh | Towards Data Science">
+            <a:extLst>
+              <a:ext uri="{FF2B5EF4-FFF2-40B4-BE49-F238E27FC236}">
+                <a16:creationId xmlns:a16="http://schemas.microsoft.com/office/drawing/2014/main" id="{84EB1844-D757-CD9D-571B-2BFB4F2E4D60}"/>
+              </a:ext>
+            </a:extLst>
+          </p:cNvPr>
+          <p:cNvPicPr>
+            <a:picLocks noChangeAspect="1" noChangeArrowheads="1"/>
+          </p:cNvPicPr>
+          <p:nvPr/>
+        </p:nvPicPr>
+        <p:blipFill>
+          <a:blip r:embed="rId4">
+            <a:extLst>
+              <a:ext uri="{28A0092B-C50C-407E-A947-70E740481C1C}">
+                <a14:useLocalDpi xmlns:a14="http://schemas.microsoft.com/office/drawing/2010/main" val="0"/>
+              </a:ext>
+            </a:extLst>
+          </a:blip>
+          <a:srcRect/>
+          <a:stretch>
+            <a:fillRect/>
+          </a:stretch>
+        </p:blipFill>
+        <p:spPr bwMode="auto">
+          <a:xfrm>
+            <a:off x="6621517" y="2174546"/>
+            <a:ext cx="4459507" cy="2997522"/>
+          </a:xfrm>
+          <a:prstGeom prst="rect">
+            <a:avLst/>
+          </a:prstGeom>
+          <a:noFill/>
+          <a:extLst>
+            <a:ext uri="{909E8E84-426E-40DD-AFC4-6F175D3DCCD1}">
+              <a14:hiddenFill xmlns:a14="http://schemas.microsoft.com/office/drawing/2010/main">
+                <a:solidFill>
+                  <a:srgbClr val="FFFFFF"/>
+                </a:solidFill>
+              </a14:hiddenFill>
+            </a:ext>
+          </a:extLst>
+        </p:spPr>
+      </p:pic>
+      <p:sp>
+        <p:nvSpPr>
+          <p:cNvPr id="14" name="TextBox 13">
+            <a:extLst>
+              <a:ext uri="{FF2B5EF4-FFF2-40B4-BE49-F238E27FC236}">
+                <a16:creationId xmlns:a16="http://schemas.microsoft.com/office/drawing/2014/main" id="{B2355EE5-D4C2-EE2B-145E-70AAF4A28A9A}"/>
+              </a:ext>
+            </a:extLst>
+          </p:cNvPr>
+          <p:cNvSpPr txBox="1"/>
+          <p:nvPr/>
+        </p:nvSpPr>
+        <p:spPr>
+          <a:xfrm>
+            <a:off x="1077310" y="5673012"/>
+            <a:ext cx="10310648" cy="830997"/>
+          </a:xfrm>
+          <a:prstGeom prst="rect">
+            <a:avLst/>
+          </a:prstGeom>
+          <a:noFill/>
+        </p:spPr>
+        <p:txBody>
+          <a:bodyPr wrap="square">
+            <a:spAutoFit/>
+          </a:bodyPr>
+          <a:lstStyle/>
+          <a:p>
+            <a:pPr algn="ctr"/>
+            <a:r>
+              <a:rPr lang="en-GB" sz="1600" b="0" i="0" dirty="0">
+                <a:effectLst/>
+                <a:latin typeface="Arial" panose="020B0604020202020204" pitchFamily="34" charset="0"/>
+                <a:cs typeface="Arial" panose="020B0604020202020204" pitchFamily="34" charset="0"/>
+              </a:rPr>
+              <a:t>Anaconda is a distribution of the Python and R programming languages for scientific computing, that aims to simplify package management and deployment. The distribution includes data-science packages suitable for Windows, Linux, and macOS</a:t>
+            </a:r>
+            <a:endParaRPr lang="en-US" sz="1600" dirty="0">
+              <a:latin typeface="Arial" panose="020B0604020202020204" pitchFamily="34" charset="0"/>
+              <a:cs typeface="Arial" panose="020B0604020202020204" pitchFamily="34" charset="0"/>
+            </a:endParaRPr>
+          </a:p>
+        </p:txBody>
+      </p:sp>
+    </p:spTree>
+    <p:extLst>
+      <p:ext uri="{BB962C8B-B14F-4D97-AF65-F5344CB8AC3E}">
+        <p14:creationId xmlns:p14="http://schemas.microsoft.com/office/powerpoint/2010/main" val="1903116467"/>
+      </p:ext>
+    </p:extLst>
+  </p:cSld>
+  <p:clrMapOvr>
+    <a:masterClrMapping/>
+  </p:clrMapOvr>
+</p:sld>
+</file>
+
+<file path=ppt/slides/slide8.xml><?xml version="1.0" encoding="utf-8"?>
 <p:sld xmlns:a="http://schemas.openxmlformats.org/drawingml/2006/main" xmlns:r="http://schemas.openxmlformats.org/officeDocument/2006/relationships" xmlns:p="http://schemas.openxmlformats.org/presentationml/2006/main">
   <p:cSld>
     <p:spTree>
@@ -8854,258 +11029,7 @@
 </p:sld>
 </file>
 
-<file path=ppt/slides/slide6.xml><?xml version="1.0" encoding="utf-8"?>
-<p:sld xmlns:a="http://schemas.openxmlformats.org/drawingml/2006/main" xmlns:r="http://schemas.openxmlformats.org/officeDocument/2006/relationships" xmlns:p="http://schemas.openxmlformats.org/presentationml/2006/main">
-  <p:cSld>
-    <p:spTree>
-      <p:nvGrpSpPr>
-        <p:cNvPr id="1" name=""/>
-        <p:cNvGrpSpPr/>
-        <p:nvPr/>
-      </p:nvGrpSpPr>
-      <p:grpSpPr>
-        <a:xfrm>
-          <a:off x="0" y="0"/>
-          <a:ext cx="0" cy="0"/>
-          <a:chOff x="0" y="0"/>
-          <a:chExt cx="0" cy="0"/>
-        </a:xfrm>
-      </p:grpSpPr>
-      <p:sp>
-        <p:nvSpPr>
-          <p:cNvPr id="2" name="TextBox 1">
-            <a:extLst>
-              <a:ext uri="{FF2B5EF4-FFF2-40B4-BE49-F238E27FC236}">
-                <a16:creationId xmlns:a16="http://schemas.microsoft.com/office/drawing/2014/main" id="{30DFB4F8-02E9-3172-BBD6-CA79A76EC796}"/>
-              </a:ext>
-            </a:extLst>
-          </p:cNvPr>
-          <p:cNvSpPr txBox="1"/>
-          <p:nvPr/>
-        </p:nvSpPr>
-        <p:spPr>
-          <a:xfrm>
-            <a:off x="0" y="441"/>
-            <a:ext cx="12192000" cy="584775"/>
-          </a:xfrm>
-          <a:prstGeom prst="rect">
-            <a:avLst/>
-          </a:prstGeom>
-          <a:noFill/>
-        </p:spPr>
-        <p:txBody>
-          <a:bodyPr wrap="square" rtlCol="0">
-            <a:spAutoFit/>
-          </a:bodyPr>
-          <a:lstStyle/>
-          <a:p>
-            <a:pPr algn="ctr"/>
-            <a:r>
-              <a:rPr lang="en-US" sz="3200" u="sng" dirty="0">
-                <a:latin typeface="Arial" panose="020B0604020202020204" pitchFamily="34" charset="0"/>
-                <a:cs typeface="Arial" panose="020B0604020202020204" pitchFamily="34" charset="0"/>
-              </a:rPr>
-              <a:t>Using virtual environments</a:t>
-            </a:r>
-          </a:p>
-        </p:txBody>
-      </p:sp>
-      <p:pic>
-        <p:nvPicPr>
-          <p:cNvPr id="6146" name="Picture 2" descr="Schedule - scRNAseq course">
-            <a:extLst>
-              <a:ext uri="{FF2B5EF4-FFF2-40B4-BE49-F238E27FC236}">
-                <a16:creationId xmlns:a16="http://schemas.microsoft.com/office/drawing/2014/main" id="{7179E1D3-728E-AC2B-B670-2A6BDE28D2F8}"/>
-              </a:ext>
-            </a:extLst>
-          </p:cNvPr>
-          <p:cNvPicPr>
-            <a:picLocks noChangeAspect="1" noChangeArrowheads="1"/>
-          </p:cNvPicPr>
-          <p:nvPr/>
-        </p:nvPicPr>
-        <p:blipFill>
-          <a:blip r:embed="rId3">
-            <a:extLst>
-              <a:ext uri="{28A0092B-C50C-407E-A947-70E740481C1C}">
-                <a14:useLocalDpi xmlns:a14="http://schemas.microsoft.com/office/drawing/2010/main" val="0"/>
-              </a:ext>
-            </a:extLst>
-          </a:blip>
-          <a:srcRect/>
-          <a:stretch>
-            <a:fillRect/>
-          </a:stretch>
-        </p:blipFill>
-        <p:spPr bwMode="auto">
-          <a:xfrm>
-            <a:off x="157655" y="1994308"/>
-            <a:ext cx="6022428" cy="3100609"/>
-          </a:xfrm>
-          <a:prstGeom prst="rect">
-            <a:avLst/>
-          </a:prstGeom>
-          <a:noFill/>
-          <a:extLst>
-            <a:ext uri="{909E8E84-426E-40DD-AFC4-6F175D3DCCD1}">
-              <a14:hiddenFill xmlns:a14="http://schemas.microsoft.com/office/drawing/2010/main">
-                <a:solidFill>
-                  <a:srgbClr val="FFFFFF"/>
-                </a:solidFill>
-              </a14:hiddenFill>
-            </a:ext>
-          </a:extLst>
-        </p:spPr>
-      </p:pic>
-      <p:sp>
-        <p:nvSpPr>
-          <p:cNvPr id="7" name="TextBox 6">
-            <a:extLst>
-              <a:ext uri="{FF2B5EF4-FFF2-40B4-BE49-F238E27FC236}">
-                <a16:creationId xmlns:a16="http://schemas.microsoft.com/office/drawing/2014/main" id="{21822919-A866-682B-0E9F-2ADA4479056F}"/>
-              </a:ext>
-            </a:extLst>
-          </p:cNvPr>
-          <p:cNvSpPr txBox="1"/>
-          <p:nvPr/>
-        </p:nvSpPr>
-        <p:spPr>
-          <a:xfrm>
-            <a:off x="804042" y="711340"/>
-            <a:ext cx="10583916" cy="646331"/>
-          </a:xfrm>
-          <a:prstGeom prst="rect">
-            <a:avLst/>
-          </a:prstGeom>
-          <a:noFill/>
-        </p:spPr>
-        <p:txBody>
-          <a:bodyPr wrap="square">
-            <a:spAutoFit/>
-          </a:bodyPr>
-          <a:lstStyle/>
-          <a:p>
-            <a:pPr algn="ctr"/>
-            <a:r>
-              <a:rPr lang="en-GB" dirty="0">
-                <a:effectLst/>
-                <a:latin typeface="Arial" panose="020B0604020202020204" pitchFamily="34" charset="0"/>
-                <a:cs typeface="Arial" panose="020B0604020202020204" pitchFamily="34" charset="0"/>
-              </a:rPr>
-              <a:t>A virtual environment is a tool that helps to keep dependencies required by different projects separate by creating an isolated virtual environment for them.</a:t>
-            </a:r>
-            <a:endParaRPr lang="en-US" dirty="0">
-              <a:latin typeface="Arial" panose="020B0604020202020204" pitchFamily="34" charset="0"/>
-              <a:cs typeface="Arial" panose="020B0604020202020204" pitchFamily="34" charset="0"/>
-            </a:endParaRPr>
-          </a:p>
-        </p:txBody>
-      </p:sp>
-      <p:pic>
-        <p:nvPicPr>
-          <p:cNvPr id="6148" name="Picture 4" descr="Getting Started with Conda. Just the basics. What is Conda? Why… | by David  R. Pugh | Towards Data Science">
-            <a:extLst>
-              <a:ext uri="{FF2B5EF4-FFF2-40B4-BE49-F238E27FC236}">
-                <a16:creationId xmlns:a16="http://schemas.microsoft.com/office/drawing/2014/main" id="{84EB1844-D757-CD9D-571B-2BFB4F2E4D60}"/>
-              </a:ext>
-            </a:extLst>
-          </p:cNvPr>
-          <p:cNvPicPr>
-            <a:picLocks noChangeAspect="1" noChangeArrowheads="1"/>
-          </p:cNvPicPr>
-          <p:nvPr/>
-        </p:nvPicPr>
-        <p:blipFill>
-          <a:blip r:embed="rId4">
-            <a:extLst>
-              <a:ext uri="{28A0092B-C50C-407E-A947-70E740481C1C}">
-                <a14:useLocalDpi xmlns:a14="http://schemas.microsoft.com/office/drawing/2010/main" val="0"/>
-              </a:ext>
-            </a:extLst>
-          </a:blip>
-          <a:srcRect/>
-          <a:stretch>
-            <a:fillRect/>
-          </a:stretch>
-        </p:blipFill>
-        <p:spPr bwMode="auto">
-          <a:xfrm>
-            <a:off x="6621517" y="2174546"/>
-            <a:ext cx="4459507" cy="2997522"/>
-          </a:xfrm>
-          <a:prstGeom prst="rect">
-            <a:avLst/>
-          </a:prstGeom>
-          <a:noFill/>
-          <a:extLst>
-            <a:ext uri="{909E8E84-426E-40DD-AFC4-6F175D3DCCD1}">
-              <a14:hiddenFill xmlns:a14="http://schemas.microsoft.com/office/drawing/2010/main">
-                <a:solidFill>
-                  <a:srgbClr val="FFFFFF"/>
-                </a:solidFill>
-              </a14:hiddenFill>
-            </a:ext>
-          </a:extLst>
-        </p:spPr>
-      </p:pic>
-      <p:sp>
-        <p:nvSpPr>
-          <p:cNvPr id="14" name="TextBox 13">
-            <a:extLst>
-              <a:ext uri="{FF2B5EF4-FFF2-40B4-BE49-F238E27FC236}">
-                <a16:creationId xmlns:a16="http://schemas.microsoft.com/office/drawing/2014/main" id="{B2355EE5-D4C2-EE2B-145E-70AAF4A28A9A}"/>
-              </a:ext>
-            </a:extLst>
-          </p:cNvPr>
-          <p:cNvSpPr txBox="1"/>
-          <p:nvPr/>
-        </p:nvSpPr>
-        <p:spPr>
-          <a:xfrm>
-            <a:off x="1077310" y="5673012"/>
-            <a:ext cx="10310648" cy="830997"/>
-          </a:xfrm>
-          <a:prstGeom prst="rect">
-            <a:avLst/>
-          </a:prstGeom>
-          <a:noFill/>
-        </p:spPr>
-        <p:txBody>
-          <a:bodyPr wrap="square">
-            <a:spAutoFit/>
-          </a:bodyPr>
-          <a:lstStyle/>
-          <a:p>
-            <a:pPr algn="ctr"/>
-            <a:r>
-              <a:rPr lang="en-GB" sz="1600" b="0" i="0" dirty="0">
-                <a:effectLst/>
-                <a:latin typeface="Arial" panose="020B0604020202020204" pitchFamily="34" charset="0"/>
-                <a:cs typeface="Arial" panose="020B0604020202020204" pitchFamily="34" charset="0"/>
-              </a:rPr>
-              <a:t>Anaconda is a distribution of the Python and R programming languages for scientific computing, that aims to simplify package management and deployment. The distribution includes data-science packages suitable for Windows, Linux, and macOS</a:t>
-            </a:r>
-            <a:endParaRPr lang="en-US" sz="1600" dirty="0">
-              <a:latin typeface="Arial" panose="020B0604020202020204" pitchFamily="34" charset="0"/>
-              <a:cs typeface="Arial" panose="020B0604020202020204" pitchFamily="34" charset="0"/>
-            </a:endParaRPr>
-          </a:p>
-        </p:txBody>
-      </p:sp>
-    </p:spTree>
-    <p:extLst>
-      <p:ext uri="{BB962C8B-B14F-4D97-AF65-F5344CB8AC3E}">
-        <p14:creationId xmlns:p14="http://schemas.microsoft.com/office/powerpoint/2010/main" val="1903116467"/>
-      </p:ext>
-    </p:extLst>
-  </p:cSld>
-  <p:clrMapOvr>
-    <a:masterClrMapping/>
-  </p:clrMapOvr>
-</p:sld>
-</file>
-
-<file path=ppt/slides/slide7.xml><?xml version="1.0" encoding="utf-8"?>
+<file path=ppt/slides/slide9.xml><?xml version="1.0" encoding="utf-8"?>
 <p:sld xmlns:a="http://schemas.openxmlformats.org/drawingml/2006/main" xmlns:r="http://schemas.openxmlformats.org/officeDocument/2006/relationships" xmlns:p="http://schemas.openxmlformats.org/presentationml/2006/main">
   <p:cSld>
     <p:spTree>
@@ -9908,847 +11832,6 @@
     <p:extLst>
       <p:ext uri="{BB962C8B-B14F-4D97-AF65-F5344CB8AC3E}">
         <p14:creationId xmlns:p14="http://schemas.microsoft.com/office/powerpoint/2010/main" val="1500308562"/>
-      </p:ext>
-    </p:extLst>
-  </p:cSld>
-  <p:clrMapOvr>
-    <a:masterClrMapping/>
-  </p:clrMapOvr>
-</p:sld>
-</file>
-
-<file path=ppt/slides/slide8.xml><?xml version="1.0" encoding="utf-8"?>
-<p:sld xmlns:a="http://schemas.openxmlformats.org/drawingml/2006/main" xmlns:r="http://schemas.openxmlformats.org/officeDocument/2006/relationships" xmlns:p="http://schemas.openxmlformats.org/presentationml/2006/main">
-  <p:cSld>
-    <p:spTree>
-      <p:nvGrpSpPr>
-        <p:cNvPr id="1" name=""/>
-        <p:cNvGrpSpPr/>
-        <p:nvPr/>
-      </p:nvGrpSpPr>
-      <p:grpSpPr>
-        <a:xfrm>
-          <a:off x="0" y="0"/>
-          <a:ext cx="0" cy="0"/>
-          <a:chOff x="0" y="0"/>
-          <a:chExt cx="0" cy="0"/>
-        </a:xfrm>
-      </p:grpSpPr>
-      <p:sp>
-        <p:nvSpPr>
-          <p:cNvPr id="2" name="TextBox 1">
-            <a:extLst>
-              <a:ext uri="{FF2B5EF4-FFF2-40B4-BE49-F238E27FC236}">
-                <a16:creationId xmlns:a16="http://schemas.microsoft.com/office/drawing/2014/main" id="{30DFB4F8-02E9-3172-BBD6-CA79A76EC796}"/>
-              </a:ext>
-            </a:extLst>
-          </p:cNvPr>
-          <p:cNvSpPr txBox="1"/>
-          <p:nvPr/>
-        </p:nvSpPr>
-        <p:spPr>
-          <a:xfrm>
-            <a:off x="0" y="441"/>
-            <a:ext cx="12192000" cy="584775"/>
-          </a:xfrm>
-          <a:prstGeom prst="rect">
-            <a:avLst/>
-          </a:prstGeom>
-          <a:noFill/>
-        </p:spPr>
-        <p:txBody>
-          <a:bodyPr wrap="square" rtlCol="0">
-            <a:spAutoFit/>
-          </a:bodyPr>
-          <a:lstStyle/>
-          <a:p>
-            <a:pPr algn="ctr"/>
-            <a:r>
-              <a:rPr lang="en-US" sz="3200" dirty="0">
-                <a:latin typeface="Arial" panose="020B0604020202020204" pitchFamily="34" charset="0"/>
-                <a:cs typeface="Arial" panose="020B0604020202020204" pitchFamily="34" charset="0"/>
-              </a:rPr>
-              <a:t>The dataset that we will use</a:t>
-            </a:r>
-          </a:p>
-        </p:txBody>
-      </p:sp>
-      <p:pic>
-        <p:nvPicPr>
-          <p:cNvPr id="12" name="Picture 11" descr="A screenshot of a computer&#10;&#10;Description automatically generated">
-            <a:extLst>
-              <a:ext uri="{FF2B5EF4-FFF2-40B4-BE49-F238E27FC236}">
-                <a16:creationId xmlns:a16="http://schemas.microsoft.com/office/drawing/2014/main" id="{AF96A619-3F67-506D-9E0C-8C125157239A}"/>
-              </a:ext>
-            </a:extLst>
-          </p:cNvPr>
-          <p:cNvPicPr>
-            <a:picLocks noChangeAspect="1"/>
-          </p:cNvPicPr>
-          <p:nvPr/>
-        </p:nvPicPr>
-        <p:blipFill>
-          <a:blip r:embed="rId3"/>
-          <a:stretch>
-            <a:fillRect/>
-          </a:stretch>
-        </p:blipFill>
-        <p:spPr>
-          <a:xfrm>
-            <a:off x="3174771" y="1191174"/>
-            <a:ext cx="5842458" cy="2424864"/>
-          </a:xfrm>
-          <a:prstGeom prst="rect">
-            <a:avLst/>
-          </a:prstGeom>
-        </p:spPr>
-      </p:pic>
-      <p:sp>
-        <p:nvSpPr>
-          <p:cNvPr id="16" name="TextBox 15">
-            <a:extLst>
-              <a:ext uri="{FF2B5EF4-FFF2-40B4-BE49-F238E27FC236}">
-                <a16:creationId xmlns:a16="http://schemas.microsoft.com/office/drawing/2014/main" id="{D7FA9F62-C3A2-42EC-9DCA-678D452ECF3D}"/>
-              </a:ext>
-            </a:extLst>
-          </p:cNvPr>
-          <p:cNvSpPr txBox="1"/>
-          <p:nvPr/>
-        </p:nvSpPr>
-        <p:spPr>
-          <a:xfrm>
-            <a:off x="3174771" y="3769823"/>
-            <a:ext cx="6097384" cy="646331"/>
-          </a:xfrm>
-          <a:prstGeom prst="rect">
-            <a:avLst/>
-          </a:prstGeom>
-          <a:noFill/>
-        </p:spPr>
-        <p:txBody>
-          <a:bodyPr wrap="square">
-            <a:spAutoFit/>
-          </a:bodyPr>
-          <a:lstStyle/>
-          <a:p>
-            <a:r>
-              <a:rPr lang="en-US" dirty="0">
-                <a:latin typeface="Arial" panose="020B0604020202020204" pitchFamily="34" charset="0"/>
-                <a:cs typeface="Arial" panose="020B0604020202020204" pitchFamily="34" charset="0"/>
-              </a:rPr>
-              <a:t>Please read the publication here:</a:t>
-            </a:r>
-          </a:p>
-          <a:p>
-            <a:r>
-              <a:rPr lang="en-US" dirty="0">
-                <a:latin typeface="Arial" panose="020B0604020202020204" pitchFamily="34" charset="0"/>
-                <a:cs typeface="Arial" panose="020B0604020202020204" pitchFamily="34" charset="0"/>
-              </a:rPr>
-              <a:t>https://</a:t>
-            </a:r>
-            <a:r>
-              <a:rPr lang="en-US" dirty="0" err="1">
-                <a:latin typeface="Arial" panose="020B0604020202020204" pitchFamily="34" charset="0"/>
-                <a:cs typeface="Arial" panose="020B0604020202020204" pitchFamily="34" charset="0"/>
-              </a:rPr>
-              <a:t>www.nature.com</a:t>
-            </a:r>
-            <a:r>
-              <a:rPr lang="en-US" dirty="0">
-                <a:latin typeface="Arial" panose="020B0604020202020204" pitchFamily="34" charset="0"/>
-                <a:cs typeface="Arial" panose="020B0604020202020204" pitchFamily="34" charset="0"/>
-              </a:rPr>
-              <a:t>/articles/nature13568</a:t>
-            </a:r>
-          </a:p>
-        </p:txBody>
-      </p:sp>
-    </p:spTree>
-    <p:extLst>
-      <p:ext uri="{BB962C8B-B14F-4D97-AF65-F5344CB8AC3E}">
-        <p14:creationId xmlns:p14="http://schemas.microsoft.com/office/powerpoint/2010/main" val="1312169158"/>
-      </p:ext>
-    </p:extLst>
-  </p:cSld>
-  <p:clrMapOvr>
-    <a:masterClrMapping/>
-  </p:clrMapOvr>
-</p:sld>
-</file>
-
-<file path=ppt/slides/slide9.xml><?xml version="1.0" encoding="utf-8"?>
-<p:sld xmlns:a="http://schemas.openxmlformats.org/drawingml/2006/main" xmlns:r="http://schemas.openxmlformats.org/officeDocument/2006/relationships" xmlns:p="http://schemas.openxmlformats.org/presentationml/2006/main">
-  <p:cSld>
-    <p:spTree>
-      <p:nvGrpSpPr>
-        <p:cNvPr id="1" name=""/>
-        <p:cNvGrpSpPr/>
-        <p:nvPr/>
-      </p:nvGrpSpPr>
-      <p:grpSpPr>
-        <a:xfrm>
-          <a:off x="0" y="0"/>
-          <a:ext cx="0" cy="0"/>
-          <a:chOff x="0" y="0"/>
-          <a:chExt cx="0" cy="0"/>
-        </a:xfrm>
-      </p:grpSpPr>
-      <p:sp>
-        <p:nvSpPr>
-          <p:cNvPr id="2" name="TextBox 1">
-            <a:extLst>
-              <a:ext uri="{FF2B5EF4-FFF2-40B4-BE49-F238E27FC236}">
-                <a16:creationId xmlns:a16="http://schemas.microsoft.com/office/drawing/2014/main" id="{30DFB4F8-02E9-3172-BBD6-CA79A76EC796}"/>
-              </a:ext>
-            </a:extLst>
-          </p:cNvPr>
-          <p:cNvSpPr txBox="1"/>
-          <p:nvPr/>
-        </p:nvSpPr>
-        <p:spPr>
-          <a:xfrm>
-            <a:off x="0" y="441"/>
-            <a:ext cx="12192000" cy="584775"/>
-          </a:xfrm>
-          <a:prstGeom prst="rect">
-            <a:avLst/>
-          </a:prstGeom>
-          <a:noFill/>
-        </p:spPr>
-        <p:txBody>
-          <a:bodyPr wrap="square" rtlCol="0">
-            <a:spAutoFit/>
-          </a:bodyPr>
-          <a:lstStyle/>
-          <a:p>
-            <a:pPr algn="ctr"/>
-            <a:r>
-              <a:rPr lang="en-US" sz="3200" u="sng" dirty="0">
-                <a:latin typeface="Arial" panose="020B0604020202020204" pitchFamily="34" charset="0"/>
-                <a:cs typeface="Arial" panose="020B0604020202020204" pitchFamily="34" charset="0"/>
-              </a:rPr>
-              <a:t>How to write the report</a:t>
-            </a:r>
-          </a:p>
-        </p:txBody>
-      </p:sp>
-      <p:grpSp>
-        <p:nvGrpSpPr>
-          <p:cNvPr id="7" name="Group 6">
-            <a:extLst>
-              <a:ext uri="{FF2B5EF4-FFF2-40B4-BE49-F238E27FC236}">
-                <a16:creationId xmlns:a16="http://schemas.microsoft.com/office/drawing/2014/main" id="{1E12B08A-3213-4CAE-415C-2466BC855D46}"/>
-              </a:ext>
-            </a:extLst>
-          </p:cNvPr>
-          <p:cNvGrpSpPr/>
-          <p:nvPr/>
-        </p:nvGrpSpPr>
-        <p:grpSpPr>
-          <a:xfrm>
-            <a:off x="625689" y="1483777"/>
-            <a:ext cx="2192594" cy="4404853"/>
-            <a:chOff x="570271" y="1317522"/>
-            <a:chExt cx="2192594" cy="4404853"/>
-          </a:xfrm>
-        </p:grpSpPr>
-        <p:sp>
-          <p:nvSpPr>
-            <p:cNvPr id="4" name="Trapezium 3">
-              <a:extLst>
-                <a:ext uri="{FF2B5EF4-FFF2-40B4-BE49-F238E27FC236}">
-                  <a16:creationId xmlns:a16="http://schemas.microsoft.com/office/drawing/2014/main" id="{0D6F35C2-09D3-4CF9-D526-2BCA3FBD6E87}"/>
-                </a:ext>
-              </a:extLst>
-            </p:cNvPr>
-            <p:cNvSpPr/>
-            <p:nvPr/>
-          </p:nvSpPr>
-          <p:spPr>
-            <a:xfrm rot="10800000">
-              <a:off x="570271" y="1317522"/>
-              <a:ext cx="2192594" cy="2202426"/>
-            </a:xfrm>
-            <a:prstGeom prst="trapezoid">
-              <a:avLst>
-                <a:gd name="adj" fmla="val 37258"/>
-              </a:avLst>
-            </a:prstGeom>
-            <a:noFill/>
-            <a:ln w="76200">
-              <a:solidFill>
-                <a:srgbClr val="002060"/>
-              </a:solidFill>
-            </a:ln>
-          </p:spPr>
-          <p:style>
-            <a:lnRef idx="2">
-              <a:schemeClr val="accent1">
-                <a:shade val="50000"/>
-              </a:schemeClr>
-            </a:lnRef>
-            <a:fillRef idx="1">
-              <a:schemeClr val="accent1"/>
-            </a:fillRef>
-            <a:effectRef idx="0">
-              <a:schemeClr val="accent1"/>
-            </a:effectRef>
-            <a:fontRef idx="minor">
-              <a:schemeClr val="lt1"/>
-            </a:fontRef>
-          </p:style>
-          <p:txBody>
-            <a:bodyPr rtlCol="0" anchor="ctr"/>
-            <a:lstStyle/>
-            <a:p>
-              <a:pPr algn="ctr"/>
-              <a:endParaRPr lang="en-US"/>
-            </a:p>
-          </p:txBody>
-        </p:sp>
-        <p:sp>
-          <p:nvSpPr>
-            <p:cNvPr id="5" name="Trapezium 4">
-              <a:extLst>
-                <a:ext uri="{FF2B5EF4-FFF2-40B4-BE49-F238E27FC236}">
-                  <a16:creationId xmlns:a16="http://schemas.microsoft.com/office/drawing/2014/main" id="{9FDB81E2-D3C7-11C9-0975-3FA318C2AD6D}"/>
-                </a:ext>
-              </a:extLst>
-            </p:cNvPr>
-            <p:cNvSpPr/>
-            <p:nvPr/>
-          </p:nvSpPr>
-          <p:spPr>
-            <a:xfrm>
-              <a:off x="570271" y="3519949"/>
-              <a:ext cx="2192594" cy="2202426"/>
-            </a:xfrm>
-            <a:prstGeom prst="trapezoid">
-              <a:avLst>
-                <a:gd name="adj" fmla="val 37258"/>
-              </a:avLst>
-            </a:prstGeom>
-            <a:noFill/>
-            <a:ln w="76200">
-              <a:solidFill>
-                <a:srgbClr val="002060"/>
-              </a:solidFill>
-            </a:ln>
-          </p:spPr>
-          <p:style>
-            <a:lnRef idx="2">
-              <a:schemeClr val="accent1">
-                <a:shade val="50000"/>
-              </a:schemeClr>
-            </a:lnRef>
-            <a:fillRef idx="1">
-              <a:schemeClr val="accent1"/>
-            </a:fillRef>
-            <a:effectRef idx="0">
-              <a:schemeClr val="accent1"/>
-            </a:effectRef>
-            <a:fontRef idx="minor">
-              <a:schemeClr val="lt1"/>
-            </a:fontRef>
-          </p:style>
-          <p:txBody>
-            <a:bodyPr rtlCol="0" anchor="ctr"/>
-            <a:lstStyle/>
-            <a:p>
-              <a:pPr algn="ctr"/>
-              <a:endParaRPr lang="en-US"/>
-            </a:p>
-          </p:txBody>
-        </p:sp>
-        <p:sp>
-          <p:nvSpPr>
-            <p:cNvPr id="6" name="Rectangle 5">
-              <a:extLst>
-                <a:ext uri="{FF2B5EF4-FFF2-40B4-BE49-F238E27FC236}">
-                  <a16:creationId xmlns:a16="http://schemas.microsoft.com/office/drawing/2014/main" id="{2CDDAFBF-9FE9-8943-303E-7DB6AB9C6AF2}"/>
-                </a:ext>
-              </a:extLst>
-            </p:cNvPr>
-            <p:cNvSpPr/>
-            <p:nvPr/>
-          </p:nvSpPr>
-          <p:spPr>
-            <a:xfrm>
-              <a:off x="1410962" y="3182471"/>
-              <a:ext cx="502617" cy="779929"/>
-            </a:xfrm>
-            <a:prstGeom prst="rect">
-              <a:avLst/>
-            </a:prstGeom>
-            <a:solidFill>
-              <a:schemeClr val="bg1"/>
-            </a:solidFill>
-            <a:ln>
-              <a:noFill/>
-            </a:ln>
-          </p:spPr>
-          <p:style>
-            <a:lnRef idx="2">
-              <a:schemeClr val="accent1">
-                <a:shade val="50000"/>
-              </a:schemeClr>
-            </a:lnRef>
-            <a:fillRef idx="1">
-              <a:schemeClr val="accent1"/>
-            </a:fillRef>
-            <a:effectRef idx="0">
-              <a:schemeClr val="accent1"/>
-            </a:effectRef>
-            <a:fontRef idx="minor">
-              <a:schemeClr val="lt1"/>
-            </a:fontRef>
-          </p:style>
-          <p:txBody>
-            <a:bodyPr rtlCol="0" anchor="ctr"/>
-            <a:lstStyle/>
-            <a:p>
-              <a:pPr algn="ctr"/>
-              <a:endParaRPr lang="en-US"/>
-            </a:p>
-          </p:txBody>
-        </p:sp>
-      </p:grpSp>
-      <p:sp>
-        <p:nvSpPr>
-          <p:cNvPr id="8" name="TextBox 7">
-            <a:extLst>
-              <a:ext uri="{FF2B5EF4-FFF2-40B4-BE49-F238E27FC236}">
-                <a16:creationId xmlns:a16="http://schemas.microsoft.com/office/drawing/2014/main" id="{A6EEFC67-77B9-80A1-AC5D-63F4D1BB761F}"/>
-              </a:ext>
-            </a:extLst>
-          </p:cNvPr>
-          <p:cNvSpPr txBox="1"/>
-          <p:nvPr/>
-        </p:nvSpPr>
-        <p:spPr>
-          <a:xfrm>
-            <a:off x="317184" y="1627879"/>
-            <a:ext cx="2902608" cy="338554"/>
-          </a:xfrm>
-          <a:prstGeom prst="rect">
-            <a:avLst/>
-          </a:prstGeom>
-          <a:noFill/>
-        </p:spPr>
-        <p:txBody>
-          <a:bodyPr wrap="square" rtlCol="0">
-            <a:spAutoFit/>
-          </a:bodyPr>
-          <a:lstStyle/>
-          <a:p>
-            <a:pPr algn="ctr"/>
-            <a:r>
-              <a:rPr lang="en-US" sz="1600" i="1" dirty="0">
-                <a:latin typeface="Arial" panose="020B0604020202020204" pitchFamily="34" charset="0"/>
-                <a:cs typeface="Arial" panose="020B0604020202020204" pitchFamily="34" charset="0"/>
-              </a:rPr>
-              <a:t>Introduction</a:t>
-            </a:r>
-          </a:p>
-        </p:txBody>
-      </p:sp>
-      <p:sp>
-        <p:nvSpPr>
-          <p:cNvPr id="9" name="TextBox 8">
-            <a:extLst>
-              <a:ext uri="{FF2B5EF4-FFF2-40B4-BE49-F238E27FC236}">
-                <a16:creationId xmlns:a16="http://schemas.microsoft.com/office/drawing/2014/main" id="{47F18639-B14D-FA9C-902A-843791AC8DBC}"/>
-              </a:ext>
-            </a:extLst>
-          </p:cNvPr>
-          <p:cNvSpPr txBox="1"/>
-          <p:nvPr/>
-        </p:nvSpPr>
-        <p:spPr>
-          <a:xfrm>
-            <a:off x="266384" y="2866711"/>
-            <a:ext cx="2902608" cy="338554"/>
-          </a:xfrm>
-          <a:prstGeom prst="rect">
-            <a:avLst/>
-          </a:prstGeom>
-          <a:noFill/>
-        </p:spPr>
-        <p:txBody>
-          <a:bodyPr wrap="square" rtlCol="0">
-            <a:spAutoFit/>
-          </a:bodyPr>
-          <a:lstStyle/>
-          <a:p>
-            <a:pPr algn="ctr"/>
-            <a:r>
-              <a:rPr lang="en-US" sz="1600" i="1" dirty="0">
-                <a:latin typeface="Arial" panose="020B0604020202020204" pitchFamily="34" charset="0"/>
-                <a:cs typeface="Arial" panose="020B0604020202020204" pitchFamily="34" charset="0"/>
-              </a:rPr>
-              <a:t>Methods</a:t>
-            </a:r>
-          </a:p>
-        </p:txBody>
-      </p:sp>
-      <p:sp>
-        <p:nvSpPr>
-          <p:cNvPr id="10" name="TextBox 9">
-            <a:extLst>
-              <a:ext uri="{FF2B5EF4-FFF2-40B4-BE49-F238E27FC236}">
-                <a16:creationId xmlns:a16="http://schemas.microsoft.com/office/drawing/2014/main" id="{62636537-8E9B-6F2F-7334-0B2C27B3859D}"/>
-              </a:ext>
-            </a:extLst>
-          </p:cNvPr>
-          <p:cNvSpPr txBox="1"/>
-          <p:nvPr/>
-        </p:nvSpPr>
-        <p:spPr>
-          <a:xfrm>
-            <a:off x="266384" y="3967065"/>
-            <a:ext cx="2902608" cy="338554"/>
-          </a:xfrm>
-          <a:prstGeom prst="rect">
-            <a:avLst/>
-          </a:prstGeom>
-          <a:noFill/>
-        </p:spPr>
-        <p:txBody>
-          <a:bodyPr wrap="square" rtlCol="0">
-            <a:spAutoFit/>
-          </a:bodyPr>
-          <a:lstStyle/>
-          <a:p>
-            <a:pPr algn="ctr"/>
-            <a:r>
-              <a:rPr lang="en-US" sz="1600" i="1" dirty="0">
-                <a:latin typeface="Arial" panose="020B0604020202020204" pitchFamily="34" charset="0"/>
-                <a:cs typeface="Arial" panose="020B0604020202020204" pitchFamily="34" charset="0"/>
-              </a:rPr>
-              <a:t>Results</a:t>
-            </a:r>
-          </a:p>
-        </p:txBody>
-      </p:sp>
-      <p:sp>
-        <p:nvSpPr>
-          <p:cNvPr id="11" name="TextBox 10">
-            <a:extLst>
-              <a:ext uri="{FF2B5EF4-FFF2-40B4-BE49-F238E27FC236}">
-                <a16:creationId xmlns:a16="http://schemas.microsoft.com/office/drawing/2014/main" id="{5DB114D6-F60D-7889-5DBF-D3AC7D56E9E8}"/>
-              </a:ext>
-            </a:extLst>
-          </p:cNvPr>
-          <p:cNvSpPr txBox="1"/>
-          <p:nvPr/>
-        </p:nvSpPr>
-        <p:spPr>
-          <a:xfrm>
-            <a:off x="317184" y="5374223"/>
-            <a:ext cx="2902608" cy="338554"/>
-          </a:xfrm>
-          <a:prstGeom prst="rect">
-            <a:avLst/>
-          </a:prstGeom>
-          <a:noFill/>
-        </p:spPr>
-        <p:txBody>
-          <a:bodyPr wrap="square" rtlCol="0">
-            <a:spAutoFit/>
-          </a:bodyPr>
-          <a:lstStyle/>
-          <a:p>
-            <a:pPr algn="ctr"/>
-            <a:r>
-              <a:rPr lang="en-US" sz="1600" i="1" dirty="0">
-                <a:latin typeface="Arial" panose="020B0604020202020204" pitchFamily="34" charset="0"/>
-                <a:cs typeface="Arial" panose="020B0604020202020204" pitchFamily="34" charset="0"/>
-              </a:rPr>
-              <a:t>Discussion</a:t>
-            </a:r>
-          </a:p>
-        </p:txBody>
-      </p:sp>
-      <p:sp>
-        <p:nvSpPr>
-          <p:cNvPr id="12" name="TextBox 11">
-            <a:extLst>
-              <a:ext uri="{FF2B5EF4-FFF2-40B4-BE49-F238E27FC236}">
-                <a16:creationId xmlns:a16="http://schemas.microsoft.com/office/drawing/2014/main" id="{6697A785-9FC8-4CBF-673C-7AB2A5C086E9}"/>
-              </a:ext>
-            </a:extLst>
-          </p:cNvPr>
-          <p:cNvSpPr txBox="1"/>
-          <p:nvPr/>
-        </p:nvSpPr>
-        <p:spPr>
-          <a:xfrm>
-            <a:off x="3168991" y="1017639"/>
-            <a:ext cx="8917906" cy="5755422"/>
-          </a:xfrm>
-          <a:prstGeom prst="rect">
-            <a:avLst/>
-          </a:prstGeom>
-          <a:noFill/>
-        </p:spPr>
-        <p:txBody>
-          <a:bodyPr wrap="square" rtlCol="0">
-            <a:spAutoFit/>
-          </a:bodyPr>
-          <a:lstStyle/>
-          <a:p>
-            <a:r>
-              <a:rPr lang="en-US" sz="1600" i="1" u="sng" dirty="0">
-                <a:latin typeface="Arial" panose="020B0604020202020204" pitchFamily="34" charset="0"/>
-                <a:cs typeface="Arial" panose="020B0604020202020204" pitchFamily="34" charset="0"/>
-              </a:rPr>
-              <a:t>Introduction</a:t>
-            </a:r>
-          </a:p>
-          <a:p>
-            <a:pPr marL="285750" indent="-285750">
-              <a:buFontTx/>
-              <a:buChar char="-"/>
-            </a:pPr>
-            <a:r>
-              <a:rPr lang="en-US" sz="1600" dirty="0">
-                <a:latin typeface="Arial" panose="020B0604020202020204" pitchFamily="34" charset="0"/>
-                <a:cs typeface="Arial" panose="020B0604020202020204" pitchFamily="34" charset="0"/>
-              </a:rPr>
-              <a:t>Always starts with the broader picture</a:t>
-            </a:r>
-          </a:p>
-          <a:p>
-            <a:pPr marL="285750" indent="-285750">
-              <a:buFontTx/>
-              <a:buChar char="-"/>
-            </a:pPr>
-            <a:r>
-              <a:rPr lang="en-US" sz="1600" dirty="0">
-                <a:latin typeface="Arial" panose="020B0604020202020204" pitchFamily="34" charset="0"/>
-                <a:cs typeface="Arial" panose="020B0604020202020204" pitchFamily="34" charset="0"/>
-              </a:rPr>
-              <a:t>1-2 paragraphs on metagenomics and/or liver cirrhosis</a:t>
-            </a:r>
-          </a:p>
-          <a:p>
-            <a:pPr marL="285750" indent="-285750">
-              <a:buFontTx/>
-              <a:buChar char="-"/>
-            </a:pPr>
-            <a:r>
-              <a:rPr lang="en-US" sz="1600" dirty="0">
-                <a:latin typeface="Arial" panose="020B0604020202020204" pitchFamily="34" charset="0"/>
-                <a:cs typeface="Arial" panose="020B0604020202020204" pitchFamily="34" charset="0"/>
-              </a:rPr>
-              <a:t>1-2 paragraphs on insights of specific studies of the microbiome in liver disease</a:t>
-            </a:r>
-          </a:p>
-          <a:p>
-            <a:pPr marL="285750" indent="-285750">
-              <a:buFontTx/>
-              <a:buChar char="-"/>
-            </a:pPr>
-            <a:r>
-              <a:rPr lang="en-US" sz="1600" dirty="0">
-                <a:latin typeface="Arial" panose="020B0604020202020204" pitchFamily="34" charset="0"/>
-                <a:cs typeface="Arial" panose="020B0604020202020204" pitchFamily="34" charset="0"/>
-              </a:rPr>
-              <a:t>1 paragraph on what you will do in this study</a:t>
-            </a:r>
-          </a:p>
-          <a:p>
-            <a:pPr marL="742950" lvl="1" indent="-285750">
-              <a:buFontTx/>
-              <a:buChar char="-"/>
-            </a:pPr>
-            <a:r>
-              <a:rPr lang="en-US" sz="1600" dirty="0">
-                <a:latin typeface="Arial" panose="020B0604020202020204" pitchFamily="34" charset="0"/>
-                <a:cs typeface="Arial" panose="020B0604020202020204" pitchFamily="34" charset="0"/>
-              </a:rPr>
-              <a:t>”In this report/study I will analyze …. to study the impact of microbiome on liver disease in ….. “</a:t>
-            </a:r>
-          </a:p>
-          <a:p>
-            <a:pPr lvl="1"/>
-            <a:endParaRPr lang="en-US" sz="1600" dirty="0">
-              <a:latin typeface="Arial" panose="020B0604020202020204" pitchFamily="34" charset="0"/>
-              <a:cs typeface="Arial" panose="020B0604020202020204" pitchFamily="34" charset="0"/>
-            </a:endParaRPr>
-          </a:p>
-          <a:p>
-            <a:r>
-              <a:rPr lang="en-US" sz="1600" i="1" u="sng" dirty="0">
-                <a:latin typeface="Arial" panose="020B0604020202020204" pitchFamily="34" charset="0"/>
-                <a:cs typeface="Arial" panose="020B0604020202020204" pitchFamily="34" charset="0"/>
-              </a:rPr>
-              <a:t>Methods</a:t>
-            </a:r>
-          </a:p>
-          <a:p>
-            <a:r>
-              <a:rPr lang="en-US" sz="1600" dirty="0">
-                <a:latin typeface="Arial" panose="020B0604020202020204" pitchFamily="34" charset="0"/>
-                <a:cs typeface="Arial" panose="020B0604020202020204" pitchFamily="34" charset="0"/>
-              </a:rPr>
-              <a:t>Try and gather as much from original paper under a heading “Sample data” and summarize in 1 paragraph</a:t>
-            </a:r>
-          </a:p>
-          <a:p>
-            <a:r>
-              <a:rPr lang="en-US" sz="1600" dirty="0">
-                <a:latin typeface="Arial" panose="020B0604020202020204" pitchFamily="34" charset="0"/>
-                <a:cs typeface="Arial" panose="020B0604020202020204" pitchFamily="34" charset="0"/>
-              </a:rPr>
-              <a:t>Then describe what you did </a:t>
-            </a:r>
-            <a:r>
-              <a:rPr lang="en-US" sz="1600" dirty="0">
-                <a:latin typeface="Arial" panose="020B0604020202020204" pitchFamily="34" charset="0"/>
-                <a:cs typeface="Arial" panose="020B0604020202020204" pitchFamily="34" charset="0"/>
-                <a:sym typeface="Wingdings" pitchFamily="2" charset="2"/>
-              </a:rPr>
-              <a:t> </a:t>
-            </a:r>
-            <a:r>
-              <a:rPr lang="en-US" sz="1600" dirty="0" err="1">
-                <a:latin typeface="Arial" panose="020B0604020202020204" pitchFamily="34" charset="0"/>
-                <a:cs typeface="Arial" panose="020B0604020202020204" pitchFamily="34" charset="0"/>
-                <a:sym typeface="Wingdings" pitchFamily="2" charset="2"/>
-              </a:rPr>
-              <a:t>metaphlan</a:t>
-            </a:r>
-            <a:r>
-              <a:rPr lang="en-US" sz="1600" dirty="0">
-                <a:latin typeface="Arial" panose="020B0604020202020204" pitchFamily="34" charset="0"/>
-                <a:cs typeface="Arial" panose="020B0604020202020204" pitchFamily="34" charset="0"/>
-                <a:sym typeface="Wingdings" pitchFamily="2" charset="2"/>
-              </a:rPr>
-              <a:t>, downstream analysis</a:t>
-            </a:r>
-          </a:p>
-          <a:p>
-            <a:r>
-              <a:rPr lang="en-US" sz="1600" dirty="0">
-                <a:latin typeface="Arial" panose="020B0604020202020204" pitchFamily="34" charset="0"/>
-                <a:cs typeface="Arial" panose="020B0604020202020204" pitchFamily="34" charset="0"/>
-                <a:sym typeface="Wingdings" pitchFamily="2" charset="2"/>
-              </a:rPr>
-              <a:t>You can attach scripts as appendices</a:t>
-            </a:r>
-          </a:p>
-          <a:p>
-            <a:endParaRPr lang="en-US" sz="1600" dirty="0">
-              <a:latin typeface="Arial" panose="020B0604020202020204" pitchFamily="34" charset="0"/>
-              <a:cs typeface="Arial" panose="020B0604020202020204" pitchFamily="34" charset="0"/>
-              <a:sym typeface="Wingdings" pitchFamily="2" charset="2"/>
-            </a:endParaRPr>
-          </a:p>
-          <a:p>
-            <a:r>
-              <a:rPr lang="en-US" sz="1600" i="1" u="sng" dirty="0">
-                <a:latin typeface="Arial" panose="020B0604020202020204" pitchFamily="34" charset="0"/>
-                <a:cs typeface="Arial" panose="020B0604020202020204" pitchFamily="34" charset="0"/>
-                <a:sym typeface="Wingdings" pitchFamily="2" charset="2"/>
-              </a:rPr>
-              <a:t>Results</a:t>
-            </a:r>
-          </a:p>
-          <a:p>
-            <a:r>
-              <a:rPr lang="en-US" sz="1600" dirty="0">
-                <a:latin typeface="Arial" panose="020B0604020202020204" pitchFamily="34" charset="0"/>
-                <a:cs typeface="Arial" panose="020B0604020202020204" pitchFamily="34" charset="0"/>
-                <a:sym typeface="Wingdings" pitchFamily="2" charset="2"/>
-              </a:rPr>
-              <a:t>Clear subheadings. Result 1 … Result 2 …. Result n</a:t>
-            </a:r>
-          </a:p>
-          <a:p>
-            <a:r>
-              <a:rPr lang="en-US" sz="1600" dirty="0">
-                <a:latin typeface="Arial" panose="020B0604020202020204" pitchFamily="34" charset="0"/>
-                <a:cs typeface="Arial" panose="020B0604020202020204" pitchFamily="34" charset="0"/>
-                <a:sym typeface="Wingdings" pitchFamily="2" charset="2"/>
-              </a:rPr>
-              <a:t>For example: “Metagenomics reveals depletion in microbiome diversity in liver disease patients”</a:t>
-            </a:r>
-          </a:p>
-          <a:p>
-            <a:r>
-              <a:rPr lang="en-US" sz="1600" dirty="0">
-                <a:latin typeface="Arial" panose="020B0604020202020204" pitchFamily="34" charset="0"/>
-                <a:cs typeface="Arial" panose="020B0604020202020204" pitchFamily="34" charset="0"/>
-                <a:sym typeface="Wingdings" pitchFamily="2" charset="2"/>
-              </a:rPr>
-              <a:t>Figures and description of </a:t>
-            </a:r>
-            <a:r>
-              <a:rPr lang="en-US" sz="1600" b="1" dirty="0">
-                <a:latin typeface="Arial" panose="020B0604020202020204" pitchFamily="34" charset="0"/>
-                <a:cs typeface="Arial" panose="020B0604020202020204" pitchFamily="34" charset="0"/>
-                <a:sym typeface="Wingdings" pitchFamily="2" charset="2"/>
-              </a:rPr>
-              <a:t>what you see in the data</a:t>
-            </a:r>
-          </a:p>
-          <a:p>
-            <a:endParaRPr lang="en-US" sz="1600" b="1" dirty="0">
-              <a:latin typeface="Arial" panose="020B0604020202020204" pitchFamily="34" charset="0"/>
-              <a:cs typeface="Arial" panose="020B0604020202020204" pitchFamily="34" charset="0"/>
-              <a:sym typeface="Wingdings" pitchFamily="2" charset="2"/>
-            </a:endParaRPr>
-          </a:p>
-          <a:p>
-            <a:r>
-              <a:rPr lang="en-US" sz="1600" i="1" u="sng" dirty="0">
-                <a:latin typeface="Arial" panose="020B0604020202020204" pitchFamily="34" charset="0"/>
-                <a:cs typeface="Arial" panose="020B0604020202020204" pitchFamily="34" charset="0"/>
-                <a:sym typeface="Wingdings" pitchFamily="2" charset="2"/>
-              </a:rPr>
-              <a:t>Discussion</a:t>
-            </a:r>
-          </a:p>
-          <a:p>
-            <a:r>
-              <a:rPr lang="en-US" sz="1600" dirty="0">
-                <a:latin typeface="Arial" panose="020B0604020202020204" pitchFamily="34" charset="0"/>
-                <a:cs typeface="Arial" panose="020B0604020202020204" pitchFamily="34" charset="0"/>
-                <a:sym typeface="Wingdings" pitchFamily="2" charset="2"/>
-              </a:rPr>
-              <a:t>Put results in broader context of literature and THINK critical about your data. </a:t>
-            </a:r>
-          </a:p>
-          <a:p>
-            <a:endParaRPr lang="en-US" sz="1600" dirty="0">
-              <a:latin typeface="Arial" panose="020B0604020202020204" pitchFamily="34" charset="0"/>
-              <a:cs typeface="Arial" panose="020B0604020202020204" pitchFamily="34" charset="0"/>
-              <a:sym typeface="Wingdings" pitchFamily="2" charset="2"/>
-            </a:endParaRPr>
-          </a:p>
-          <a:p>
-            <a:pPr algn="ctr"/>
-            <a:r>
-              <a:rPr lang="en-US" sz="1600" u="sng" dirty="0">
-                <a:latin typeface="Arial" panose="020B0604020202020204" pitchFamily="34" charset="0"/>
-                <a:cs typeface="Arial" panose="020B0604020202020204" pitchFamily="34" charset="0"/>
-                <a:sym typeface="Wingdings" pitchFamily="2" charset="2"/>
-              </a:rPr>
-              <a:t>This is an MSc course!!!</a:t>
-            </a:r>
-            <a:endParaRPr lang="en-US" sz="1600" u="sng" dirty="0">
-              <a:latin typeface="Arial" panose="020B0604020202020204" pitchFamily="34" charset="0"/>
-              <a:cs typeface="Arial" panose="020B0604020202020204" pitchFamily="34" charset="0"/>
-            </a:endParaRPr>
-          </a:p>
-        </p:txBody>
-      </p:sp>
-    </p:spTree>
-    <p:extLst>
-      <p:ext uri="{BB962C8B-B14F-4D97-AF65-F5344CB8AC3E}">
-        <p14:creationId xmlns:p14="http://schemas.microsoft.com/office/powerpoint/2010/main" val="2871601039"/>
       </p:ext>
     </p:extLst>
   </p:cSld>

</xml_diff>